<commit_message>
updated ppt with feedback
</commit_message>
<xml_diff>
--- a/docs/Pitch Project Startup.pptx
+++ b/docs/Pitch Project Startup.pptx
@@ -8,18 +8,19 @@
     <p:sldId id="256" r:id="rId2"/>
     <p:sldId id="264" r:id="rId3"/>
     <p:sldId id="262" r:id="rId4"/>
-    <p:sldId id="258" r:id="rId5"/>
-    <p:sldId id="259" r:id="rId6"/>
-    <p:sldId id="260" r:id="rId7"/>
-    <p:sldId id="263" r:id="rId8"/>
-    <p:sldId id="261" r:id="rId9"/>
+    <p:sldId id="272" r:id="rId5"/>
+    <p:sldId id="258" r:id="rId6"/>
+    <p:sldId id="259" r:id="rId7"/>
+    <p:sldId id="260" r:id="rId8"/>
+    <p:sldId id="263" r:id="rId9"/>
     <p:sldId id="265" r:id="rId10"/>
-    <p:sldId id="271" r:id="rId11"/>
-    <p:sldId id="266" r:id="rId12"/>
-    <p:sldId id="270" r:id="rId13"/>
-    <p:sldId id="268" r:id="rId14"/>
-    <p:sldId id="267" r:id="rId15"/>
-    <p:sldId id="269" r:id="rId16"/>
+    <p:sldId id="261" r:id="rId11"/>
+    <p:sldId id="271" r:id="rId12"/>
+    <p:sldId id="266" r:id="rId13"/>
+    <p:sldId id="270" r:id="rId14"/>
+    <p:sldId id="268" r:id="rId15"/>
+    <p:sldId id="267" r:id="rId16"/>
+    <p:sldId id="269" r:id="rId17"/>
   </p:sldIdLst>
   <p:sldSz cx="12192000" cy="6858000"/>
   <p:notesSz cx="6858000" cy="9144000"/>
@@ -118,6 +119,11 @@
       </a:defRPr>
     </a:lvl9pPr>
   </p:defaultTextStyle>
+  <p:extLst>
+    <p:ext uri="{EFAFB233-063F-42B5-8137-9DF3F51BA10A}">
+      <p15:sldGuideLst xmlns:p15="http://schemas.microsoft.com/office/powerpoint/2012/main"/>
+    </p:ext>
+  </p:extLst>
 </p:presentation>
 </file>
 
@@ -289,7 +295,7 @@
           <a:p>
             <a:fld id="{D466D703-4496-4B5A-86AF-A9F8F3799ACF}" type="datetimeFigureOut">
               <a:rPr lang="nl-NL" smtClean="0"/>
-              <a:t>18-4-2024</a:t>
+              <a:t>19-4-2024</a:t>
             </a:fld>
             <a:endParaRPr lang="nl-NL"/>
           </a:p>
@@ -517,7 +523,7 @@
           <a:p>
             <a:fld id="{D466D703-4496-4B5A-86AF-A9F8F3799ACF}" type="datetimeFigureOut">
               <a:rPr lang="nl-NL" smtClean="0"/>
-              <a:t>18-4-2024</a:t>
+              <a:t>19-4-2024</a:t>
             </a:fld>
             <a:endParaRPr lang="nl-NL"/>
           </a:p>
@@ -697,7 +703,7 @@
           <a:p>
             <a:fld id="{D466D703-4496-4B5A-86AF-A9F8F3799ACF}" type="datetimeFigureOut">
               <a:rPr lang="nl-NL" smtClean="0"/>
-              <a:t>18-4-2024</a:t>
+              <a:t>19-4-2024</a:t>
             </a:fld>
             <a:endParaRPr lang="nl-NL"/>
           </a:p>
@@ -867,7 +873,7 @@
           <a:p>
             <a:fld id="{D466D703-4496-4B5A-86AF-A9F8F3799ACF}" type="datetimeFigureOut">
               <a:rPr lang="nl-NL" smtClean="0"/>
-              <a:t>18-4-2024</a:t>
+              <a:t>19-4-2024</a:t>
             </a:fld>
             <a:endParaRPr lang="nl-NL"/>
           </a:p>
@@ -1121,7 +1127,7 @@
           <a:p>
             <a:fld id="{D466D703-4496-4B5A-86AF-A9F8F3799ACF}" type="datetimeFigureOut">
               <a:rPr lang="nl-NL" smtClean="0"/>
-              <a:t>18-4-2024</a:t>
+              <a:t>19-4-2024</a:t>
             </a:fld>
             <a:endParaRPr lang="nl-NL"/>
           </a:p>
@@ -1447,7 +1453,7 @@
           <a:p>
             <a:fld id="{D466D703-4496-4B5A-86AF-A9F8F3799ACF}" type="datetimeFigureOut">
               <a:rPr lang="nl-NL" smtClean="0"/>
-              <a:t>18-4-2024</a:t>
+              <a:t>19-4-2024</a:t>
             </a:fld>
             <a:endParaRPr lang="nl-NL"/>
           </a:p>
@@ -1898,7 +1904,7 @@
           <a:p>
             <a:fld id="{D466D703-4496-4B5A-86AF-A9F8F3799ACF}" type="datetimeFigureOut">
               <a:rPr lang="nl-NL" smtClean="0"/>
-              <a:t>18-4-2024</a:t>
+              <a:t>19-4-2024</a:t>
             </a:fld>
             <a:endParaRPr lang="nl-NL"/>
           </a:p>
@@ -2016,7 +2022,7 @@
           <a:p>
             <a:fld id="{D466D703-4496-4B5A-86AF-A9F8F3799ACF}" type="datetimeFigureOut">
               <a:rPr lang="nl-NL" smtClean="0"/>
-              <a:t>18-4-2024</a:t>
+              <a:t>19-4-2024</a:t>
             </a:fld>
             <a:endParaRPr lang="nl-NL"/>
           </a:p>
@@ -2111,7 +2117,7 @@
           <a:p>
             <a:fld id="{D466D703-4496-4B5A-86AF-A9F8F3799ACF}" type="datetimeFigureOut">
               <a:rPr lang="nl-NL" smtClean="0"/>
-              <a:t>18-4-2024</a:t>
+              <a:t>19-4-2024</a:t>
             </a:fld>
             <a:endParaRPr lang="nl-NL"/>
           </a:p>
@@ -2398,7 +2404,7 @@
           <a:p>
             <a:fld id="{D466D703-4496-4B5A-86AF-A9F8F3799ACF}" type="datetimeFigureOut">
               <a:rPr lang="nl-NL" smtClean="0"/>
-              <a:t>18-4-2024</a:t>
+              <a:t>19-4-2024</a:t>
             </a:fld>
             <a:endParaRPr lang="nl-NL"/>
           </a:p>
@@ -2720,7 +2726,7 @@
           <a:p>
             <a:fld id="{D466D703-4496-4B5A-86AF-A9F8F3799ACF}" type="datetimeFigureOut">
               <a:rPr lang="nl-NL" smtClean="0"/>
-              <a:t>18-4-2024</a:t>
+              <a:t>19-4-2024</a:t>
             </a:fld>
             <a:endParaRPr lang="nl-NL"/>
           </a:p>
@@ -2974,7 +2980,7 @@
           <a:p>
             <a:fld id="{D466D703-4496-4B5A-86AF-A9F8F3799ACF}" type="datetimeFigureOut">
               <a:rPr lang="nl-NL" smtClean="0"/>
-              <a:t>18-4-2024</a:t>
+              <a:t>19-4-2024</a:t>
             </a:fld>
             <a:endParaRPr lang="nl-NL"/>
           </a:p>
@@ -3532,6 +3538,14 @@
 <file path=ppt/slides/slide10.xml><?xml version="1.0" encoding="utf-8"?>
 <p:sld xmlns:a="http://schemas.openxmlformats.org/drawingml/2006/main" xmlns:r="http://schemas.openxmlformats.org/officeDocument/2006/relationships" xmlns:p="http://schemas.openxmlformats.org/presentationml/2006/main">
   <p:cSld>
+    <p:bg>
+      <p:bgPr>
+        <a:solidFill>
+          <a:schemeClr val="bg1"/>
+        </a:solidFill>
+        <a:effectLst/>
+      </p:bgPr>
+    </p:bg>
     <p:spTree>
       <p:nvGrpSpPr>
         <p:cNvPr id="1" name=""/>
@@ -3546,6 +3560,263 @@
           <a:chExt cx="0" cy="0"/>
         </a:xfrm>
       </p:grpSpPr>
+      <p:sp useBgFill="1">
+        <p:nvSpPr>
+          <p:cNvPr id="10" name="Rectangle 9">
+            <a:extLst>
+              <a:ext uri="{FF2B5EF4-FFF2-40B4-BE49-F238E27FC236}">
+                <a16:creationId xmlns:a16="http://schemas.microsoft.com/office/drawing/2014/main" id="{E53F4E5A-C9EE-4859-B46B-F018F7D73A03}"/>
+              </a:ext>
+              <a:ext uri="{C183D7F6-B498-43B3-948B-1728B52AA6E4}">
+                <adec:decorative xmlns:adec="http://schemas.microsoft.com/office/drawing/2017/decorative" val="1"/>
+              </a:ext>
+            </a:extLst>
+          </p:cNvPr>
+          <p:cNvSpPr>
+            <a:spLocks noGrp="1" noRot="1" noChangeAspect="1" noMove="1" noResize="1" noEditPoints="1" noAdjustHandles="1" noChangeArrowheads="1" noChangeShapeType="1" noTextEdit="1"/>
+          </p:cNvSpPr>
+          <p:nvPr>
+            <p:extLst>
+              <p:ext uri="{386F3935-93C4-4BCD-93E2-E3B085C9AB24}">
+                <p16:designElem xmlns:p16="http://schemas.microsoft.com/office/powerpoint/2015/main" val="1"/>
+              </p:ext>
+            </p:extLst>
+          </p:nvPr>
+        </p:nvSpPr>
+        <p:spPr>
+          <a:xfrm>
+            <a:off x="0" y="0"/>
+            <a:ext cx="11292840" cy="6858000"/>
+          </a:xfrm>
+          <a:prstGeom prst="rect">
+            <a:avLst/>
+          </a:prstGeom>
+          <a:ln>
+            <a:noFill/>
+          </a:ln>
+        </p:spPr>
+        <p:style>
+          <a:lnRef idx="2">
+            <a:schemeClr val="accent1">
+              <a:shade val="50000"/>
+            </a:schemeClr>
+          </a:lnRef>
+          <a:fillRef idx="1">
+            <a:schemeClr val="accent1"/>
+          </a:fillRef>
+          <a:effectRef idx="0">
+            <a:schemeClr val="accent1"/>
+          </a:effectRef>
+          <a:fontRef idx="minor">
+            <a:schemeClr val="lt1"/>
+          </a:fontRef>
+        </p:style>
+        <p:txBody>
+          <a:bodyPr rtlCol="0" anchor="ctr"/>
+          <a:lstStyle/>
+          <a:p>
+            <a:pPr algn="ctr"/>
+            <a:endParaRPr lang="en-US"/>
+          </a:p>
+        </p:txBody>
+      </p:sp>
+      <p:sp>
+        <p:nvSpPr>
+          <p:cNvPr id="2" name="Title 1">
+            <a:extLst>
+              <a:ext uri="{FF2B5EF4-FFF2-40B4-BE49-F238E27FC236}">
+                <a16:creationId xmlns:a16="http://schemas.microsoft.com/office/drawing/2014/main" id="{F7EB11C1-4F82-C425-D2E4-E4CA42860F4E}"/>
+              </a:ext>
+            </a:extLst>
+          </p:cNvPr>
+          <p:cNvSpPr>
+            <a:spLocks noGrp="1"/>
+          </p:cNvSpPr>
+          <p:nvPr>
+            <p:ph type="title"/>
+          </p:nvPr>
+        </p:nvSpPr>
+        <p:spPr>
+          <a:xfrm>
+            <a:off x="643468" y="4564674"/>
+            <a:ext cx="4010820" cy="1615461"/>
+          </a:xfrm>
+        </p:spPr>
+        <p:txBody>
+          <a:bodyPr anchor="ctr">
+            <a:normAutofit/>
+          </a:bodyPr>
+          <a:lstStyle/>
+          <a:p>
+            <a:r>
+              <a:rPr lang="en-US" sz="3200"/>
+              <a:t>Scrum</a:t>
+            </a:r>
+            <a:endParaRPr lang="nl-NL" sz="3200"/>
+          </a:p>
+        </p:txBody>
+      </p:sp>
+      <p:pic>
+        <p:nvPicPr>
+          <p:cNvPr id="5" name="Picture 4">
+            <a:extLst>
+              <a:ext uri="{FF2B5EF4-FFF2-40B4-BE49-F238E27FC236}">
+                <a16:creationId xmlns:a16="http://schemas.microsoft.com/office/drawing/2014/main" id="{308FD53A-E8D7-5942-65B7-91D4C91B2DC8}"/>
+              </a:ext>
+            </a:extLst>
+          </p:cNvPr>
+          <p:cNvPicPr>
+            <a:picLocks noChangeAspect="1"/>
+          </p:cNvPicPr>
+          <p:nvPr/>
+        </p:nvPicPr>
+        <p:blipFill rotWithShape="1">
+          <a:blip r:embed="rId2"/>
+          <a:srcRect l="-537" t="355" r="744" b="1024"/>
+          <a:stretch/>
+        </p:blipFill>
+        <p:spPr>
+          <a:xfrm>
+            <a:off x="-47995" y="1371600"/>
+            <a:ext cx="11340835" cy="2893655"/>
+          </a:xfrm>
+          <a:prstGeom prst="rect">
+            <a:avLst/>
+          </a:prstGeom>
+        </p:spPr>
+      </p:pic>
+      <p:cxnSp>
+        <p:nvCxnSpPr>
+          <p:cNvPr id="12" name="Straight Connector 11">
+            <a:extLst>
+              <a:ext uri="{FF2B5EF4-FFF2-40B4-BE49-F238E27FC236}">
+                <a16:creationId xmlns:a16="http://schemas.microsoft.com/office/drawing/2014/main" id="{041A955B-D579-48FD-A51C-51B0C0B69F9A}"/>
+              </a:ext>
+              <a:ext uri="{C183D7F6-B498-43B3-948B-1728B52AA6E4}">
+                <adec:decorative xmlns:adec="http://schemas.microsoft.com/office/drawing/2017/decorative" val="1"/>
+              </a:ext>
+            </a:extLst>
+          </p:cNvPr>
+          <p:cNvCxnSpPr>
+            <a:cxnSpLocks noGrp="1" noRot="1" noChangeAspect="1" noMove="1" noResize="1" noEditPoints="1" noAdjustHandles="1" noChangeArrowheads="1" noChangeShapeType="1"/>
+          </p:cNvCxnSpPr>
+          <p:nvPr>
+            <p:extLst>
+              <p:ext uri="{386F3935-93C4-4BCD-93E2-E3B085C9AB24}">
+                <p16:designElem xmlns:p16="http://schemas.microsoft.com/office/powerpoint/2015/main" val="1"/>
+              </p:ext>
+            </p:extLst>
+          </p:nvPr>
+        </p:nvCxnSpPr>
+        <p:spPr>
+          <a:xfrm>
+            <a:off x="4953000" y="4813604"/>
+            <a:ext cx="0" cy="1117600"/>
+          </a:xfrm>
+          <a:prstGeom prst="line">
+            <a:avLst/>
+          </a:prstGeom>
+          <a:ln>
+            <a:solidFill>
+              <a:schemeClr val="accent1"/>
+            </a:solidFill>
+          </a:ln>
+        </p:spPr>
+        <p:style>
+          <a:lnRef idx="1">
+            <a:schemeClr val="accent1"/>
+          </a:lnRef>
+          <a:fillRef idx="0">
+            <a:schemeClr val="accent1"/>
+          </a:fillRef>
+          <a:effectRef idx="0">
+            <a:schemeClr val="accent1"/>
+          </a:effectRef>
+          <a:fontRef idx="minor">
+            <a:schemeClr val="tx1"/>
+          </a:fontRef>
+        </p:style>
+      </p:cxnSp>
+      <p:sp>
+        <p:nvSpPr>
+          <p:cNvPr id="3" name="Content Placeholder 2">
+            <a:extLst>
+              <a:ext uri="{FF2B5EF4-FFF2-40B4-BE49-F238E27FC236}">
+                <a16:creationId xmlns:a16="http://schemas.microsoft.com/office/drawing/2014/main" id="{0BDB1A19-0CAF-3E91-C730-468C978654AC}"/>
+              </a:ext>
+            </a:extLst>
+          </p:cNvPr>
+          <p:cNvSpPr>
+            <a:spLocks noGrp="1"/>
+          </p:cNvSpPr>
+          <p:nvPr>
+            <p:ph idx="1"/>
+          </p:nvPr>
+        </p:nvSpPr>
+        <p:spPr>
+          <a:xfrm>
+            <a:off x="5288640" y="4564673"/>
+            <a:ext cx="5665871" cy="1615463"/>
+          </a:xfrm>
+        </p:spPr>
+        <p:txBody>
+          <a:bodyPr anchor="ctr">
+            <a:normAutofit/>
+          </a:bodyPr>
+          <a:lstStyle/>
+          <a:p>
+            <a:r>
+              <a:rPr lang="en-US" sz="1600"/>
+              <a:t>Scrum-like omgeving</a:t>
+            </a:r>
+          </a:p>
+          <a:p>
+            <a:r>
+              <a:rPr lang="en-US" sz="1600"/>
+              <a:t>Taken, userstories en issue tracking</a:t>
+            </a:r>
+            <a:endParaRPr lang="nl-NL" sz="1600"/>
+          </a:p>
+        </p:txBody>
+      </p:sp>
+    </p:spTree>
+    <p:extLst>
+      <p:ext uri="{BB962C8B-B14F-4D97-AF65-F5344CB8AC3E}">
+        <p14:creationId xmlns:p14="http://schemas.microsoft.com/office/powerpoint/2010/main" val="3293275134"/>
+      </p:ext>
+    </p:extLst>
+  </p:cSld>
+  <p:clrMapOvr>
+    <a:masterClrMapping/>
+  </p:clrMapOvr>
+</p:sld>
+</file>
+
+<file path=ppt/slides/slide11.xml><?xml version="1.0" encoding="utf-8"?>
+<p:sld xmlns:a="http://schemas.openxmlformats.org/drawingml/2006/main" xmlns:r="http://schemas.openxmlformats.org/officeDocument/2006/relationships" xmlns:p="http://schemas.openxmlformats.org/presentationml/2006/main">
+  <p:cSld>
+    <p:bg>
+      <p:bgPr>
+        <a:solidFill>
+          <a:schemeClr val="bg1"/>
+        </a:solidFill>
+        <a:effectLst/>
+      </p:bgPr>
+    </p:bg>
+    <p:spTree>
+      <p:nvGrpSpPr>
+        <p:cNvPr id="1" name=""/>
+        <p:cNvGrpSpPr/>
+        <p:nvPr/>
+      </p:nvGrpSpPr>
+      <p:grpSpPr>
+        <a:xfrm>
+          <a:off x="0" y="0"/>
+          <a:ext cx="0" cy="0"/>
+          <a:chOff x="0" y="0"/>
+          <a:chExt cx="0" cy="0"/>
+        </a:xfrm>
+      </p:grpSpPr>
       <p:sp>
         <p:nvSpPr>
           <p:cNvPr id="2" name="Title 1">
@@ -3562,16 +3833,85 @@
             <p:ph type="title"/>
           </p:nvPr>
         </p:nvSpPr>
-        <p:spPr/>
-        <p:txBody>
-          <a:bodyPr/>
-          <a:lstStyle/>
-          <a:p>
-            <a:r>
-              <a:rPr lang="en-US" dirty="0"/>
+        <p:spPr>
+          <a:xfrm>
+            <a:off x="1237489" y="640080"/>
+            <a:ext cx="3075836" cy="1325562"/>
+          </a:xfrm>
+        </p:spPr>
+        <p:txBody>
+          <a:bodyPr>
+            <a:normAutofit/>
+          </a:bodyPr>
+          <a:lstStyle/>
+          <a:p>
+            <a:r>
+              <a:rPr lang="en-US" sz="3200"/>
               <a:t>IDE</a:t>
             </a:r>
-            <a:endParaRPr lang="nl-NL" dirty="0"/>
+            <a:endParaRPr lang="nl-NL" sz="3200"/>
+          </a:p>
+        </p:txBody>
+      </p:sp>
+      <p:sp>
+        <p:nvSpPr>
+          <p:cNvPr id="10" name="Rectangle 9">
+            <a:extLst>
+              <a:ext uri="{FF2B5EF4-FFF2-40B4-BE49-F238E27FC236}">
+                <a16:creationId xmlns:a16="http://schemas.microsoft.com/office/drawing/2014/main" id="{0B67D982-25C5-4CC2-AA64-276BE3B2CA75}"/>
+              </a:ext>
+              <a:ext uri="{C183D7F6-B498-43B3-948B-1728B52AA6E4}">
+                <adec:decorative xmlns:adec="http://schemas.microsoft.com/office/drawing/2017/decorative" val="1"/>
+              </a:ext>
+            </a:extLst>
+          </p:cNvPr>
+          <p:cNvSpPr>
+            <a:spLocks noGrp="1" noRot="1" noChangeAspect="1" noMove="1" noResize="1" noEditPoints="1" noAdjustHandles="1" noChangeArrowheads="1" noChangeShapeType="1" noTextEdit="1"/>
+          </p:cNvSpPr>
+          <p:nvPr>
+            <p:extLst>
+              <p:ext uri="{386F3935-93C4-4BCD-93E2-E3B085C9AB24}">
+                <p16:designElem xmlns:p16="http://schemas.microsoft.com/office/powerpoint/2015/main" val="1"/>
+              </p:ext>
+            </p:extLst>
+          </p:nvPr>
+        </p:nvSpPr>
+        <p:spPr>
+          <a:xfrm>
+            <a:off x="0" y="0"/>
+            <a:ext cx="914400" cy="6858000"/>
+          </a:xfrm>
+          <a:prstGeom prst="rect">
+            <a:avLst/>
+          </a:prstGeom>
+          <a:solidFill>
+            <a:schemeClr val="accent1"/>
+          </a:solidFill>
+          <a:ln>
+            <a:noFill/>
+          </a:ln>
+        </p:spPr>
+        <p:style>
+          <a:lnRef idx="2">
+            <a:schemeClr val="accent1">
+              <a:shade val="50000"/>
+            </a:schemeClr>
+          </a:lnRef>
+          <a:fillRef idx="1">
+            <a:schemeClr val="accent1"/>
+          </a:fillRef>
+          <a:effectRef idx="0">
+            <a:schemeClr val="accent1"/>
+          </a:effectRef>
+          <a:fontRef idx="minor">
+            <a:schemeClr val="lt1"/>
+          </a:fontRef>
+        </p:style>
+        <p:txBody>
+          <a:bodyPr/>
+          <a:lstStyle/>
+          <a:p>
+            <a:endParaRPr lang="nl-NL"/>
           </a:p>
         </p:txBody>
       </p:sp>
@@ -3591,48 +3931,115 @@
             <p:ph idx="1"/>
           </p:nvPr>
         </p:nvSpPr>
-        <p:spPr/>
-        <p:txBody>
-          <a:bodyPr/>
-          <a:lstStyle/>
-          <a:p>
+        <p:spPr>
+          <a:xfrm>
+            <a:off x="1237489" y="2301555"/>
+            <a:ext cx="3075836" cy="3878582"/>
+          </a:xfrm>
+        </p:spPr>
+        <p:txBody>
+          <a:bodyPr>
+            <a:normAutofit/>
+          </a:bodyPr>
+          <a:lstStyle/>
+          <a:p>
+            <a:r>
+              <a:rPr lang="en-US" sz="1600" dirty="0" err="1"/>
+              <a:t>VSCode</a:t>
+            </a:r>
+            <a:endParaRPr lang="en-US" sz="1600" dirty="0"/>
+          </a:p>
+          <a:p>
+            <a:pPr lvl="1"/>
+            <a:r>
+              <a:rPr lang="en-US" dirty="0"/>
+              <a:t>STM32 </a:t>
+            </a:r>
             <a:r>
               <a:rPr lang="en-US" dirty="0" err="1"/>
               <a:t>VSCode</a:t>
             </a:r>
-            <a:endParaRPr lang="en-US" dirty="0"/>
+            <a:r>
+              <a:rPr lang="en-US" dirty="0"/>
+              <a:t> Extension</a:t>
+            </a:r>
+          </a:p>
+          <a:p>
+            <a:pPr lvl="2"/>
+            <a:r>
+              <a:rPr lang="en-US" sz="1600" dirty="0"/>
+              <a:t>STM32Cube CLT</a:t>
+            </a:r>
+          </a:p>
+          <a:p>
+            <a:pPr lvl="2"/>
+            <a:r>
+              <a:rPr lang="en-US" sz="1600" dirty="0"/>
+              <a:t>STM32Cube MX</a:t>
+            </a:r>
           </a:p>
           <a:p>
             <a:pPr lvl="1"/>
             <a:r>
-              <a:rPr lang="en-US" dirty="0"/>
-              <a:t>STM32 </a:t>
-            </a:r>
-            <a:r>
-              <a:rPr lang="en-US" dirty="0" err="1"/>
-              <a:t>VSCode</a:t>
-            </a:r>
-            <a:r>
-              <a:rPr lang="en-US" dirty="0"/>
-              <a:t> Extension</a:t>
-            </a:r>
-          </a:p>
-          <a:p>
-            <a:pPr lvl="2"/>
-            <a:r>
-              <a:rPr lang="en-US" dirty="0"/>
-              <a:t>STM32Cube CLT</a:t>
-            </a:r>
-          </a:p>
-          <a:p>
-            <a:pPr lvl="2"/>
-            <a:r>
-              <a:rPr lang="en-US" dirty="0"/>
-              <a:t>STM32Cube MX</a:t>
-            </a:r>
-          </a:p>
-        </p:txBody>
-      </p:sp>
+              <a:rPr lang="en-US" sz="1800" dirty="0"/>
+              <a:t>Git </a:t>
+            </a:r>
+            <a:r>
+              <a:rPr lang="en-US" sz="1800" dirty="0" err="1"/>
+              <a:t>Integratie</a:t>
+            </a:r>
+            <a:endParaRPr lang="en-US" sz="1800" dirty="0"/>
+          </a:p>
+          <a:p>
+            <a:pPr lvl="1"/>
+            <a:r>
+              <a:rPr lang="en-US" sz="1800" dirty="0" err="1"/>
+              <a:t>Automatische</a:t>
+            </a:r>
+            <a:r>
+              <a:rPr lang="en-US" sz="1800" dirty="0"/>
+              <a:t> </a:t>
+            </a:r>
+            <a:r>
+              <a:rPr lang="en-US" sz="1800" dirty="0" err="1"/>
+              <a:t>JavaDoc</a:t>
+            </a:r>
+            <a:r>
+              <a:rPr lang="en-US" sz="1800" dirty="0"/>
+              <a:t> comments</a:t>
+            </a:r>
+          </a:p>
+        </p:txBody>
+      </p:sp>
+      <p:pic>
+        <p:nvPicPr>
+          <p:cNvPr id="5" name="Picture 4">
+            <a:extLst>
+              <a:ext uri="{FF2B5EF4-FFF2-40B4-BE49-F238E27FC236}">
+                <a16:creationId xmlns:a16="http://schemas.microsoft.com/office/drawing/2014/main" id="{D02AAB44-56D9-9627-0145-3F5BAB24A3FA}"/>
+              </a:ext>
+            </a:extLst>
+          </p:cNvPr>
+          <p:cNvPicPr>
+            <a:picLocks noChangeAspect="1"/>
+          </p:cNvPicPr>
+          <p:nvPr/>
+        </p:nvPicPr>
+        <p:blipFill rotWithShape="1">
+          <a:blip r:embed="rId2"/>
+          <a:srcRect r="1706"/>
+          <a:stretch/>
+        </p:blipFill>
+        <p:spPr>
+          <a:xfrm>
+            <a:off x="4639057" y="10"/>
+            <a:ext cx="7552944" cy="6857990"/>
+          </a:xfrm>
+          <a:prstGeom prst="rect">
+            <a:avLst/>
+          </a:prstGeom>
+        </p:spPr>
+      </p:pic>
     </p:spTree>
     <p:extLst>
       <p:ext uri="{BB962C8B-B14F-4D97-AF65-F5344CB8AC3E}">
@@ -3646,7 +4053,7 @@
 </p:sld>
 </file>
 
-<file path=ppt/slides/slide11.xml><?xml version="1.0" encoding="utf-8"?>
+<file path=ppt/slides/slide12.xml><?xml version="1.0" encoding="utf-8"?>
 <p:sld xmlns:a="http://schemas.openxmlformats.org/drawingml/2006/main" xmlns:r="http://schemas.openxmlformats.org/officeDocument/2006/relationships" xmlns:p="http://schemas.openxmlformats.org/presentationml/2006/main">
   <p:cSld>
     <p:spTree>
@@ -3719,6 +4126,160 @@
           <a:p>
             <a:r>
               <a:rPr lang="en-US" dirty="0" err="1"/>
+              <a:t>Gerealiseerd</a:t>
+            </a:r>
+            <a:r>
+              <a:rPr lang="en-US" dirty="0"/>
+              <a:t>:</a:t>
+            </a:r>
+          </a:p>
+          <a:p>
+            <a:pPr lvl="1"/>
+            <a:r>
+              <a:rPr lang="en-US" dirty="0"/>
+              <a:t>Review </a:t>
+            </a:r>
+            <a:r>
+              <a:rPr lang="en-US" dirty="0" err="1"/>
+              <a:t>verplicht</a:t>
+            </a:r>
+            <a:r>
+              <a:rPr lang="en-US" dirty="0"/>
+              <a:t> </a:t>
+            </a:r>
+            <a:r>
+              <a:rPr lang="en-US" dirty="0" err="1"/>
+              <a:t>voor</a:t>
+            </a:r>
+            <a:r>
+              <a:rPr lang="en-US" dirty="0"/>
+              <a:t> merge</a:t>
+            </a:r>
+          </a:p>
+          <a:p>
+            <a:pPr lvl="1"/>
+            <a:r>
+              <a:rPr lang="en-US" dirty="0" err="1"/>
+              <a:t>Compilatie</a:t>
+            </a:r>
+            <a:r>
+              <a:rPr lang="en-US" dirty="0"/>
+              <a:t> </a:t>
+            </a:r>
+            <a:r>
+              <a:rPr lang="en-US" dirty="0" err="1"/>
+              <a:t>controle</a:t>
+            </a:r>
+            <a:r>
+              <a:rPr lang="en-US" dirty="0"/>
+              <a:t> (</a:t>
+            </a:r>
+            <a:r>
+              <a:rPr lang="en-US" dirty="0" err="1"/>
+              <a:t>verplicht</a:t>
+            </a:r>
+            <a:r>
+              <a:rPr lang="en-US" dirty="0"/>
+              <a:t> </a:t>
+            </a:r>
+            <a:r>
+              <a:rPr lang="en-US" dirty="0" err="1"/>
+              <a:t>voor</a:t>
+            </a:r>
+            <a:r>
+              <a:rPr lang="en-US" dirty="0"/>
+              <a:t> merge)</a:t>
+            </a:r>
+          </a:p>
+          <a:p>
+            <a:pPr lvl="1"/>
+            <a:r>
+              <a:rPr lang="en-US" dirty="0" err="1"/>
+              <a:t>Verbod</a:t>
+            </a:r>
+            <a:r>
+              <a:rPr lang="en-US" dirty="0"/>
+              <a:t> om </a:t>
+            </a:r>
+            <a:r>
+              <a:rPr lang="en-US" dirty="0" err="1"/>
+              <a:t>naar</a:t>
+            </a:r>
+            <a:r>
+              <a:rPr lang="en-US" dirty="0"/>
+              <a:t> main </a:t>
+            </a:r>
+            <a:r>
+              <a:rPr lang="en-US" dirty="0" err="1"/>
+              <a:t>te</a:t>
+            </a:r>
+            <a:r>
+              <a:rPr lang="en-US" dirty="0"/>
+              <a:t> </a:t>
+            </a:r>
+            <a:r>
+              <a:rPr lang="en-US" dirty="0" err="1"/>
+              <a:t>pushen</a:t>
+            </a:r>
+            <a:endParaRPr lang="en-US" dirty="0"/>
+          </a:p>
+          <a:p>
+            <a:pPr lvl="1"/>
+            <a:r>
+              <a:rPr lang="en-US" dirty="0" err="1"/>
+              <a:t>Doxygen</a:t>
+            </a:r>
+            <a:r>
+              <a:rPr lang="en-US" dirty="0"/>
+              <a:t> </a:t>
+            </a:r>
+            <a:r>
+              <a:rPr lang="en-US" dirty="0" err="1"/>
+              <a:t>generatie</a:t>
+            </a:r>
+            <a:endParaRPr lang="en-US" dirty="0"/>
+          </a:p>
+          <a:p>
+            <a:pPr lvl="1"/>
+            <a:r>
+              <a:rPr lang="en-US" dirty="0" err="1"/>
+              <a:t>Automatische</a:t>
+            </a:r>
+            <a:r>
+              <a:rPr lang="en-US" dirty="0"/>
+              <a:t> deliverable </a:t>
+            </a:r>
+            <a:r>
+              <a:rPr lang="en-US" dirty="0" err="1"/>
+              <a:t>generatie</a:t>
+            </a:r>
+            <a:r>
+              <a:rPr lang="en-US" dirty="0"/>
+              <a:t> </a:t>
+            </a:r>
+            <a:br>
+              <a:rPr lang="en-US" dirty="0"/>
+            </a:br>
+            <a:r>
+              <a:rPr lang="en-US" dirty="0"/>
+              <a:t>	(</a:t>
+            </a:r>
+            <a:r>
+              <a:rPr lang="en-US" dirty="0" err="1"/>
+              <a:t>Doxygen</a:t>
+            </a:r>
+            <a:r>
+              <a:rPr lang="en-US" dirty="0"/>
+              <a:t> docs + .elf)</a:t>
+            </a:r>
+          </a:p>
+          <a:p>
+            <a:pPr lvl="1"/>
+            <a:endParaRPr lang="en-US" dirty="0"/>
+          </a:p>
+          <a:p>
+            <a:r>
+              <a:rPr lang="en-US" dirty="0" err="1"/>
               <a:t>Gepland</a:t>
             </a:r>
             <a:r>
@@ -3737,16 +4298,31 @@
             <a:pPr lvl="1"/>
             <a:r>
               <a:rPr lang="en-US" dirty="0"/>
-              <a:t>Clang tidy</a:t>
+              <a:t>Clang tidy (code </a:t>
+            </a:r>
+            <a:r>
+              <a:rPr lang="en-US" dirty="0" err="1"/>
+              <a:t>kwaliteit</a:t>
+            </a:r>
+            <a:r>
+              <a:rPr lang="en-US" dirty="0"/>
+              <a:t>)</a:t>
             </a:r>
           </a:p>
           <a:p>
             <a:pPr lvl="1"/>
             <a:r>
-              <a:rPr lang="en-US" dirty="0"/>
-              <a:t>Meer? @jesse</a:t>
-            </a:r>
-            <a:endParaRPr lang="nl-NL" dirty="0"/>
+              <a:rPr lang="en-US" dirty="0" err="1"/>
+              <a:t>Doxygen</a:t>
+            </a:r>
+            <a:r>
+              <a:rPr lang="en-US" dirty="0"/>
+              <a:t> publish</a:t>
+            </a:r>
+          </a:p>
+          <a:p>
+            <a:pPr lvl="1"/>
+            <a:endParaRPr lang="en-US" dirty="0"/>
           </a:p>
         </p:txBody>
       </p:sp>
@@ -3793,9 +4369,17 @@
 </p:sld>
 </file>
 
-<file path=ppt/slides/slide12.xml><?xml version="1.0" encoding="utf-8"?>
+<file path=ppt/slides/slide13.xml><?xml version="1.0" encoding="utf-8"?>
 <p:sld xmlns:a="http://schemas.openxmlformats.org/drawingml/2006/main" xmlns:r="http://schemas.openxmlformats.org/officeDocument/2006/relationships" xmlns:p="http://schemas.openxmlformats.org/presentationml/2006/main">
   <p:cSld>
+    <p:bg>
+      <p:bgPr>
+        <a:solidFill>
+          <a:schemeClr val="bg1"/>
+        </a:solidFill>
+        <a:effectLst/>
+      </p:bgPr>
+    </p:bg>
     <p:spTree>
       <p:nvGrpSpPr>
         <p:cNvPr id="1" name=""/>
@@ -3826,16 +4410,23 @@
             <p:ph type="title"/>
           </p:nvPr>
         </p:nvSpPr>
-        <p:spPr/>
-        <p:txBody>
-          <a:bodyPr/>
-          <a:lstStyle/>
-          <a:p>
-            <a:r>
-              <a:rPr lang="en-US" dirty="0"/>
+        <p:spPr>
+          <a:xfrm>
+            <a:off x="804671" y="365760"/>
+            <a:ext cx="4835635" cy="1805940"/>
+          </a:xfrm>
+        </p:spPr>
+        <p:txBody>
+          <a:bodyPr>
+            <a:normAutofit/>
+          </a:bodyPr>
+          <a:lstStyle/>
+          <a:p>
+            <a:r>
+              <a:rPr lang="en-US" sz="4000"/>
               <a:t>Review</a:t>
             </a:r>
-            <a:endParaRPr lang="nl-NL" dirty="0"/>
+            <a:endParaRPr lang="nl-NL" sz="4000"/>
           </a:p>
         </p:txBody>
       </p:sp>
@@ -3855,18 +4446,27 @@
             <p:ph idx="1"/>
           </p:nvPr>
         </p:nvSpPr>
-        <p:spPr/>
-        <p:txBody>
-          <a:bodyPr/>
-          <a:lstStyle/>
-          <a:p>
-            <a:r>
-              <a:rPr lang="en-US" dirty="0" err="1"/>
-              <a:t>Controle</a:t>
-            </a:r>
-            <a:r>
-              <a:rPr lang="en-US" dirty="0"/>
-              <a:t> op</a:t>
+        <p:spPr>
+          <a:xfrm>
+            <a:off x="804671" y="2314575"/>
+            <a:ext cx="4824603" cy="3865562"/>
+          </a:xfrm>
+        </p:spPr>
+        <p:txBody>
+          <a:bodyPr>
+            <a:normAutofit/>
+          </a:bodyPr>
+          <a:lstStyle/>
+          <a:p>
+            <a:r>
+              <a:rPr lang="en-US"/>
+              <a:t>Handmatige controle door iemand anders dan de taak eigenaar</a:t>
+            </a:r>
+          </a:p>
+          <a:p>
+            <a:r>
+              <a:rPr lang="en-US"/>
+              <a:t>Controle op:</a:t>
             </a:r>
           </a:p>
           <a:p>
@@ -3879,11 +4479,19 @@
           <a:p>
             <a:pPr lvl="1"/>
             <a:r>
+              <a:rPr lang="en-US"/>
+              <a:t>Inhoud</a:t>
+            </a:r>
+            <a:endParaRPr lang="en-US" dirty="0"/>
+          </a:p>
+          <a:p>
+            <a:pPr lvl="1"/>
+            <a:r>
               <a:rPr lang="en-US" dirty="0"/>
               <a:t>Naming (prefixes, </a:t>
             </a:r>
             <a:r>
-              <a:rPr lang="en-US" dirty="0" err="1"/>
+              <a:rPr lang="en-US"/>
               <a:t>logica</a:t>
             </a:r>
             <a:r>
@@ -3908,20 +4516,8 @@
           </a:p>
           <a:p>
             <a:r>
-              <a:rPr lang="en-US" dirty="0" err="1"/>
-              <a:t>Eigenaar</a:t>
-            </a:r>
-            <a:r>
-              <a:rPr lang="en-US" dirty="0"/>
-              <a:t> </a:t>
-            </a:r>
-            <a:r>
-              <a:rPr lang="en-US" dirty="0" err="1"/>
-              <a:t>taak</a:t>
-            </a:r>
-            <a:r>
-              <a:rPr lang="en-US" dirty="0"/>
-              <a:t> merged.</a:t>
+              <a:rPr lang="en-US"/>
+              <a:t>Eigenaar taak merged.</a:t>
             </a:r>
           </a:p>
           <a:p>
@@ -3930,114 +4526,68 @@
           </a:p>
         </p:txBody>
       </p:sp>
+      <p:pic>
+        <p:nvPicPr>
+          <p:cNvPr id="7" name="Picture 6">
+            <a:extLst>
+              <a:ext uri="{FF2B5EF4-FFF2-40B4-BE49-F238E27FC236}">
+                <a16:creationId xmlns:a16="http://schemas.microsoft.com/office/drawing/2014/main" id="{101ADA9D-9F0B-048D-3B9E-2F9C9D27B89A}"/>
+              </a:ext>
+            </a:extLst>
+          </p:cNvPr>
+          <p:cNvPicPr>
+            <a:picLocks noChangeAspect="1"/>
+          </p:cNvPicPr>
+          <p:nvPr/>
+        </p:nvPicPr>
+        <p:blipFill rotWithShape="1">
+          <a:blip r:embed="rId2"/>
+          <a:srcRect r="35727" b="1"/>
+          <a:stretch/>
+        </p:blipFill>
+        <p:spPr>
+          <a:xfrm>
+            <a:off x="6095999" y="3502068"/>
+            <a:ext cx="5075239" cy="3355932"/>
+          </a:xfrm>
+          <a:prstGeom prst="rect">
+            <a:avLst/>
+          </a:prstGeom>
+        </p:spPr>
+      </p:pic>
+      <p:pic>
+        <p:nvPicPr>
+          <p:cNvPr id="5" name="Picture 4">
+            <a:extLst>
+              <a:ext uri="{FF2B5EF4-FFF2-40B4-BE49-F238E27FC236}">
+                <a16:creationId xmlns:a16="http://schemas.microsoft.com/office/drawing/2014/main" id="{5E7B9783-2C3A-494A-2FB4-8BD4C5045295}"/>
+              </a:ext>
+            </a:extLst>
+          </p:cNvPr>
+          <p:cNvPicPr>
+            <a:picLocks noChangeAspect="1"/>
+          </p:cNvPicPr>
+          <p:nvPr/>
+        </p:nvPicPr>
+        <p:blipFill rotWithShape="1">
+          <a:blip r:embed="rId3"/>
+          <a:srcRect l="907" r="36053" b="-1"/>
+          <a:stretch/>
+        </p:blipFill>
+        <p:spPr>
+          <a:xfrm>
+            <a:off x="6096000" y="47625"/>
+            <a:ext cx="5075238" cy="3381375"/>
+          </a:xfrm>
+          <a:prstGeom prst="rect">
+            <a:avLst/>
+          </a:prstGeom>
+        </p:spPr>
+      </p:pic>
     </p:spTree>
     <p:extLst>
       <p:ext uri="{BB962C8B-B14F-4D97-AF65-F5344CB8AC3E}">
         <p14:creationId xmlns:p14="http://schemas.microsoft.com/office/powerpoint/2010/main" val="1379230065"/>
-      </p:ext>
-    </p:extLst>
-  </p:cSld>
-  <p:clrMapOvr>
-    <a:masterClrMapping/>
-  </p:clrMapOvr>
-</p:sld>
-</file>
-
-<file path=ppt/slides/slide13.xml><?xml version="1.0" encoding="utf-8"?>
-<p:sld xmlns:a="http://schemas.openxmlformats.org/drawingml/2006/main" xmlns:r="http://schemas.openxmlformats.org/officeDocument/2006/relationships" xmlns:p="http://schemas.openxmlformats.org/presentationml/2006/main">
-  <p:cSld>
-    <p:spTree>
-      <p:nvGrpSpPr>
-        <p:cNvPr id="1" name=""/>
-        <p:cNvGrpSpPr/>
-        <p:nvPr/>
-      </p:nvGrpSpPr>
-      <p:grpSpPr>
-        <a:xfrm>
-          <a:off x="0" y="0"/>
-          <a:ext cx="0" cy="0"/>
-          <a:chOff x="0" y="0"/>
-          <a:chExt cx="0" cy="0"/>
-        </a:xfrm>
-      </p:grpSpPr>
-      <p:sp>
-        <p:nvSpPr>
-          <p:cNvPr id="2" name="Title 1">
-            <a:extLst>
-              <a:ext uri="{FF2B5EF4-FFF2-40B4-BE49-F238E27FC236}">
-                <a16:creationId xmlns:a16="http://schemas.microsoft.com/office/drawing/2014/main" id="{3EAE4282-86E8-EB68-2CAD-80BA67FBEFB9}"/>
-              </a:ext>
-            </a:extLst>
-          </p:cNvPr>
-          <p:cNvSpPr>
-            <a:spLocks noGrp="1"/>
-          </p:cNvSpPr>
-          <p:nvPr>
-            <p:ph type="title"/>
-          </p:nvPr>
-        </p:nvSpPr>
-        <p:spPr/>
-        <p:txBody>
-          <a:bodyPr/>
-          <a:lstStyle/>
-          <a:p>
-            <a:r>
-              <a:rPr lang="en-US" dirty="0" err="1"/>
-              <a:t>Professioneel</a:t>
-            </a:r>
-            <a:endParaRPr lang="nl-NL" dirty="0"/>
-          </a:p>
-        </p:txBody>
-      </p:sp>
-      <p:sp>
-        <p:nvSpPr>
-          <p:cNvPr id="3" name="Text Placeholder 2">
-            <a:extLst>
-              <a:ext uri="{FF2B5EF4-FFF2-40B4-BE49-F238E27FC236}">
-                <a16:creationId xmlns:a16="http://schemas.microsoft.com/office/drawing/2014/main" id="{F89D5E26-D625-2114-E1F5-C567B91F8C85}"/>
-              </a:ext>
-            </a:extLst>
-          </p:cNvPr>
-          <p:cNvSpPr>
-            <a:spLocks noGrp="1"/>
-          </p:cNvSpPr>
-          <p:nvPr>
-            <p:ph type="body" idx="1"/>
-          </p:nvPr>
-        </p:nvSpPr>
-        <p:spPr/>
-        <p:txBody>
-          <a:bodyPr/>
-          <a:lstStyle/>
-          <a:p>
-            <a:r>
-              <a:rPr lang="en-US" dirty="0" err="1"/>
-              <a:t>Samenwerking</a:t>
-            </a:r>
-            <a:r>
-              <a:rPr lang="en-US" dirty="0"/>
-              <a:t> </a:t>
-            </a:r>
-            <a:r>
-              <a:rPr lang="en-US" dirty="0" err="1"/>
-              <a:t>en</a:t>
-            </a:r>
-            <a:r>
-              <a:rPr lang="en-US" dirty="0"/>
-              <a:t> </a:t>
-            </a:r>
-            <a:r>
-              <a:rPr lang="en-US" dirty="0" err="1"/>
-              <a:t>risico’s</a:t>
-            </a:r>
-            <a:endParaRPr lang="nl-NL" dirty="0"/>
-          </a:p>
-        </p:txBody>
-      </p:sp>
-    </p:spTree>
-    <p:extLst>
-      <p:ext uri="{BB962C8B-B14F-4D97-AF65-F5344CB8AC3E}">
-        <p14:creationId xmlns:p14="http://schemas.microsoft.com/office/powerpoint/2010/main" val="4256620044"/>
       </p:ext>
     </p:extLst>
   </p:cSld>
@@ -4069,6 +4619,110 @@
           <p:cNvPr id="2" name="Title 1">
             <a:extLst>
               <a:ext uri="{FF2B5EF4-FFF2-40B4-BE49-F238E27FC236}">
+                <a16:creationId xmlns:a16="http://schemas.microsoft.com/office/drawing/2014/main" id="{3EAE4282-86E8-EB68-2CAD-80BA67FBEFB9}"/>
+              </a:ext>
+            </a:extLst>
+          </p:cNvPr>
+          <p:cNvSpPr>
+            <a:spLocks noGrp="1"/>
+          </p:cNvSpPr>
+          <p:nvPr>
+            <p:ph type="title"/>
+          </p:nvPr>
+        </p:nvSpPr>
+        <p:spPr/>
+        <p:txBody>
+          <a:bodyPr/>
+          <a:lstStyle/>
+          <a:p>
+            <a:r>
+              <a:rPr lang="en-US" dirty="0" err="1"/>
+              <a:t>Professioneel</a:t>
+            </a:r>
+            <a:endParaRPr lang="nl-NL" dirty="0"/>
+          </a:p>
+        </p:txBody>
+      </p:sp>
+      <p:sp>
+        <p:nvSpPr>
+          <p:cNvPr id="3" name="Text Placeholder 2">
+            <a:extLst>
+              <a:ext uri="{FF2B5EF4-FFF2-40B4-BE49-F238E27FC236}">
+                <a16:creationId xmlns:a16="http://schemas.microsoft.com/office/drawing/2014/main" id="{F89D5E26-D625-2114-E1F5-C567B91F8C85}"/>
+              </a:ext>
+            </a:extLst>
+          </p:cNvPr>
+          <p:cNvSpPr>
+            <a:spLocks noGrp="1"/>
+          </p:cNvSpPr>
+          <p:nvPr>
+            <p:ph type="body" idx="1"/>
+          </p:nvPr>
+        </p:nvSpPr>
+        <p:spPr/>
+        <p:txBody>
+          <a:bodyPr/>
+          <a:lstStyle/>
+          <a:p>
+            <a:r>
+              <a:rPr lang="en-US" dirty="0" err="1"/>
+              <a:t>Samenwerking</a:t>
+            </a:r>
+            <a:r>
+              <a:rPr lang="en-US" dirty="0"/>
+              <a:t> </a:t>
+            </a:r>
+            <a:r>
+              <a:rPr lang="en-US" dirty="0" err="1"/>
+              <a:t>en</a:t>
+            </a:r>
+            <a:r>
+              <a:rPr lang="en-US" dirty="0"/>
+              <a:t> </a:t>
+            </a:r>
+            <a:r>
+              <a:rPr lang="en-US" dirty="0" err="1"/>
+              <a:t>risico’s</a:t>
+            </a:r>
+            <a:endParaRPr lang="nl-NL" dirty="0"/>
+          </a:p>
+        </p:txBody>
+      </p:sp>
+    </p:spTree>
+    <p:extLst>
+      <p:ext uri="{BB962C8B-B14F-4D97-AF65-F5344CB8AC3E}">
+        <p14:creationId xmlns:p14="http://schemas.microsoft.com/office/powerpoint/2010/main" val="4256620044"/>
+      </p:ext>
+    </p:extLst>
+  </p:cSld>
+  <p:clrMapOvr>
+    <a:masterClrMapping/>
+  </p:clrMapOvr>
+</p:sld>
+</file>
+
+<file path=ppt/slides/slide15.xml><?xml version="1.0" encoding="utf-8"?>
+<p:sld xmlns:a="http://schemas.openxmlformats.org/drawingml/2006/main" xmlns:r="http://schemas.openxmlformats.org/officeDocument/2006/relationships" xmlns:p="http://schemas.openxmlformats.org/presentationml/2006/main">
+  <p:cSld>
+    <p:spTree>
+      <p:nvGrpSpPr>
+        <p:cNvPr id="1" name=""/>
+        <p:cNvGrpSpPr/>
+        <p:nvPr/>
+      </p:nvGrpSpPr>
+      <p:grpSpPr>
+        <a:xfrm>
+          <a:off x="0" y="0"/>
+          <a:ext cx="0" cy="0"/>
+          <a:chOff x="0" y="0"/>
+          <a:chExt cx="0" cy="0"/>
+        </a:xfrm>
+      </p:grpSpPr>
+      <p:sp>
+        <p:nvSpPr>
+          <p:cNvPr id="2" name="Title 1">
+            <a:extLst>
+              <a:ext uri="{FF2B5EF4-FFF2-40B4-BE49-F238E27FC236}">
                 <a16:creationId xmlns:a16="http://schemas.microsoft.com/office/drawing/2014/main" id="{315A0E67-088B-BD42-FAFC-9653FFCC528A}"/>
               </a:ext>
             </a:extLst>
@@ -4115,6 +4769,12 @@
           <a:lstStyle/>
           <a:p>
             <a:r>
+              <a:rPr lang="en-US" dirty="0"/>
+              <a:t>GitHub</a:t>
+            </a:r>
+          </a:p>
+          <a:p>
+            <a:r>
               <a:rPr lang="en-US" dirty="0" err="1"/>
               <a:t>Whatsapp</a:t>
             </a:r>
@@ -4175,13 +4835,24 @@
             </a:r>
             <a:r>
               <a:rPr lang="en-US" dirty="0"/>
-              <a:t> </a:t>
+              <a:t> het </a:t>
             </a:r>
             <a:r>
               <a:rPr lang="en-US" dirty="0" err="1"/>
               <a:t>scrumboard</a:t>
             </a:r>
-            <a:endParaRPr lang="en-US" dirty="0"/>
+            <a:r>
+              <a:rPr lang="en-US" dirty="0"/>
+              <a:t> </a:t>
+            </a:r>
+            <a:r>
+              <a:rPr lang="en-US" dirty="0" err="1"/>
+              <a:t>en</a:t>
+            </a:r>
+            <a:r>
+              <a:rPr lang="en-US" dirty="0"/>
+              <a:t> issue tracking</a:t>
+            </a:r>
           </a:p>
           <a:p>
             <a:endParaRPr lang="nl-NL" dirty="0"/>
@@ -4201,7 +4872,7 @@
 </p:sld>
 </file>
 
-<file path=ppt/slides/slide15.xml><?xml version="1.0" encoding="utf-8"?>
+<file path=ppt/slides/slide16.xml><?xml version="1.0" encoding="utf-8"?>
 <p:sld xmlns:a="http://schemas.openxmlformats.org/drawingml/2006/main" xmlns:r="http://schemas.openxmlformats.org/officeDocument/2006/relationships" xmlns:p="http://schemas.openxmlformats.org/presentationml/2006/main">
   <p:cSld>
     <p:spTree>
@@ -4533,6 +5204,14 @@
 <file path=ppt/slides/slide4.xml><?xml version="1.0" encoding="utf-8"?>
 <p:sld xmlns:a="http://schemas.openxmlformats.org/drawingml/2006/main" xmlns:r="http://schemas.openxmlformats.org/officeDocument/2006/relationships" xmlns:p="http://schemas.openxmlformats.org/presentationml/2006/main">
   <p:cSld>
+    <p:bg>
+      <p:bgPr>
+        <a:solidFill>
+          <a:schemeClr val="bg1"/>
+        </a:solidFill>
+        <a:effectLst/>
+      </p:bgPr>
+    </p:bg>
     <p:spTree>
       <p:nvGrpSpPr>
         <p:cNvPr id="1" name=""/>
@@ -4549,6 +5228,193 @@
       </p:grpSpPr>
       <p:sp>
         <p:nvSpPr>
+          <p:cNvPr id="12" name="Rectangle 11">
+            <a:extLst>
+              <a:ext uri="{FF2B5EF4-FFF2-40B4-BE49-F238E27FC236}">
+                <a16:creationId xmlns:a16="http://schemas.microsoft.com/office/drawing/2014/main" id="{5D5E0904-721C-4D68-9EB8-1C9752E329A7}"/>
+              </a:ext>
+              <a:ext uri="{C183D7F6-B498-43B3-948B-1728B52AA6E4}">
+                <adec:decorative xmlns:adec="http://schemas.microsoft.com/office/drawing/2017/decorative" val="1"/>
+              </a:ext>
+            </a:extLst>
+          </p:cNvPr>
+          <p:cNvSpPr>
+            <a:spLocks noGrp="1" noRot="1" noChangeAspect="1" noMove="1" noResize="1" noEditPoints="1" noAdjustHandles="1" noChangeArrowheads="1" noChangeShapeType="1" noTextEdit="1"/>
+          </p:cNvSpPr>
+          <p:nvPr>
+            <p:extLst>
+              <p:ext uri="{386F3935-93C4-4BCD-93E2-E3B085C9AB24}">
+                <p16:designElem xmlns:p16="http://schemas.microsoft.com/office/powerpoint/2015/main" val="1"/>
+              </p:ext>
+            </p:extLst>
+          </p:nvPr>
+        </p:nvSpPr>
+        <p:spPr>
+          <a:xfrm>
+            <a:off x="0" y="0"/>
+            <a:ext cx="457200" cy="6858000"/>
+          </a:xfrm>
+          <a:prstGeom prst="rect">
+            <a:avLst/>
+          </a:prstGeom>
+          <a:solidFill>
+            <a:schemeClr val="accent1"/>
+          </a:solidFill>
+          <a:ln>
+            <a:noFill/>
+          </a:ln>
+        </p:spPr>
+        <p:style>
+          <a:lnRef idx="2">
+            <a:schemeClr val="accent1">
+              <a:shade val="50000"/>
+            </a:schemeClr>
+          </a:lnRef>
+          <a:fillRef idx="1">
+            <a:schemeClr val="accent1"/>
+          </a:fillRef>
+          <a:effectRef idx="0">
+            <a:schemeClr val="accent1"/>
+          </a:effectRef>
+          <a:fontRef idx="minor">
+            <a:schemeClr val="lt1"/>
+          </a:fontRef>
+        </p:style>
+        <p:txBody>
+          <a:bodyPr/>
+          <a:lstStyle/>
+          <a:p>
+            <a:endParaRPr lang="nl-NL"/>
+          </a:p>
+        </p:txBody>
+      </p:sp>
+      <p:sp>
+        <p:nvSpPr>
+          <p:cNvPr id="14" name="Rectangle 13">
+            <a:extLst>
+              <a:ext uri="{FF2B5EF4-FFF2-40B4-BE49-F238E27FC236}">
+                <a16:creationId xmlns:a16="http://schemas.microsoft.com/office/drawing/2014/main" id="{B298ECBA-3258-45DF-8FD4-7581736BCCBC}"/>
+              </a:ext>
+              <a:ext uri="{C183D7F6-B498-43B3-948B-1728B52AA6E4}">
+                <adec:decorative xmlns:adec="http://schemas.microsoft.com/office/drawing/2017/decorative" val="1"/>
+              </a:ext>
+            </a:extLst>
+          </p:cNvPr>
+          <p:cNvSpPr>
+            <a:spLocks noGrp="1" noRot="1" noChangeAspect="1" noMove="1" noResize="1" noEditPoints="1" noAdjustHandles="1" noChangeArrowheads="1" noChangeShapeType="1" noTextEdit="1"/>
+          </p:cNvSpPr>
+          <p:nvPr>
+            <p:extLst>
+              <p:ext uri="{386F3935-93C4-4BCD-93E2-E3B085C9AB24}">
+                <p16:designElem xmlns:p16="http://schemas.microsoft.com/office/powerpoint/2015/main" val="1"/>
+              </p:ext>
+            </p:extLst>
+          </p:nvPr>
+        </p:nvSpPr>
+        <p:spPr>
+          <a:xfrm>
+            <a:off x="0" y="-3244"/>
+            <a:ext cx="457200" cy="6858000"/>
+          </a:xfrm>
+          <a:prstGeom prst="rect">
+            <a:avLst/>
+          </a:prstGeom>
+          <a:solidFill>
+            <a:srgbClr val="6F6F74"/>
+          </a:solidFill>
+          <a:ln>
+            <a:noFill/>
+          </a:ln>
+        </p:spPr>
+        <p:style>
+          <a:lnRef idx="2">
+            <a:schemeClr val="accent1">
+              <a:shade val="50000"/>
+            </a:schemeClr>
+          </a:lnRef>
+          <a:fillRef idx="1">
+            <a:schemeClr val="accent1"/>
+          </a:fillRef>
+          <a:effectRef idx="0">
+            <a:schemeClr val="accent1"/>
+          </a:effectRef>
+          <a:fontRef idx="minor">
+            <a:schemeClr val="lt1"/>
+          </a:fontRef>
+        </p:style>
+        <p:txBody>
+          <a:bodyPr rtlCol="0" anchor="ctr"/>
+          <a:lstStyle/>
+          <a:p>
+            <a:pPr algn="ctr"/>
+            <a:endParaRPr lang="en-US"/>
+          </a:p>
+        </p:txBody>
+      </p:sp>
+      <p:sp>
+        <p:nvSpPr>
+          <p:cNvPr id="16" name="Rectangle 15">
+            <a:extLst>
+              <a:ext uri="{FF2B5EF4-FFF2-40B4-BE49-F238E27FC236}">
+                <a16:creationId xmlns:a16="http://schemas.microsoft.com/office/drawing/2014/main" id="{B62BF453-BD82-4B90-9FE7-51703133806E}"/>
+              </a:ext>
+              <a:ext uri="{C183D7F6-B498-43B3-948B-1728B52AA6E4}">
+                <adec:decorative xmlns:adec="http://schemas.microsoft.com/office/drawing/2017/decorative" val="1"/>
+              </a:ext>
+            </a:extLst>
+          </p:cNvPr>
+          <p:cNvSpPr>
+            <a:spLocks noGrp="1" noRot="1" noChangeAspect="1" noMove="1" noResize="1" noEditPoints="1" noAdjustHandles="1" noChangeArrowheads="1" noChangeShapeType="1" noTextEdit="1"/>
+          </p:cNvSpPr>
+          <p:nvPr>
+            <p:extLst>
+              <p:ext uri="{386F3935-93C4-4BCD-93E2-E3B085C9AB24}">
+                <p16:designElem xmlns:p16="http://schemas.microsoft.com/office/powerpoint/2015/main" val="1"/>
+              </p:ext>
+            </p:extLst>
+          </p:nvPr>
+        </p:nvSpPr>
+        <p:spPr>
+          <a:xfrm>
+            <a:off x="457200" y="0"/>
+            <a:ext cx="10835640" cy="6858000"/>
+          </a:xfrm>
+          <a:prstGeom prst="rect">
+            <a:avLst/>
+          </a:prstGeom>
+          <a:solidFill>
+            <a:srgbClr val="353537"/>
+          </a:solidFill>
+          <a:ln>
+            <a:noFill/>
+          </a:ln>
+        </p:spPr>
+        <p:style>
+          <a:lnRef idx="2">
+            <a:schemeClr val="accent1">
+              <a:shade val="50000"/>
+            </a:schemeClr>
+          </a:lnRef>
+          <a:fillRef idx="1">
+            <a:schemeClr val="accent1"/>
+          </a:fillRef>
+          <a:effectRef idx="0">
+            <a:schemeClr val="accent1"/>
+          </a:effectRef>
+          <a:fontRef idx="minor">
+            <a:schemeClr val="lt1"/>
+          </a:fontRef>
+        </p:style>
+        <p:txBody>
+          <a:bodyPr/>
+          <a:lstStyle/>
+          <a:p>
+            <a:endParaRPr lang="nl-NL"/>
+          </a:p>
+        </p:txBody>
+      </p:sp>
+      <p:sp>
+        <p:nvSpPr>
           <p:cNvPr id="2" name="Title 1">
             <a:extLst>
               <a:ext uri="{FF2B5EF4-FFF2-40B4-BE49-F238E27FC236}">
@@ -4563,87 +5429,193 @@
             <p:ph type="title"/>
           </p:nvPr>
         </p:nvSpPr>
-        <p:spPr/>
-        <p:txBody>
-          <a:bodyPr/>
-          <a:lstStyle/>
-          <a:p>
-            <a:r>
-              <a:rPr lang="en-US" dirty="0"/>
-              <a:t>Application Layer</a:t>
-            </a:r>
-            <a:endParaRPr lang="nl-NL" dirty="0"/>
-          </a:p>
-        </p:txBody>
-      </p:sp>
-      <p:sp>
-        <p:nvSpPr>
-          <p:cNvPr id="3" name="Content Placeholder 2">
+        <p:spPr>
+          <a:xfrm>
+            <a:off x="8318090" y="758952"/>
+            <a:ext cx="2802194" cy="4041648"/>
+          </a:xfrm>
+        </p:spPr>
+        <p:txBody>
+          <a:bodyPr vert="horz" lIns="91440" tIns="45720" rIns="91440" bIns="45720" rtlCol="0" anchor="b">
+            <a:normAutofit/>
+          </a:bodyPr>
+          <a:lstStyle/>
+          <a:p>
+            <a:pPr>
+              <a:lnSpc>
+                <a:spcPct val="85000"/>
+              </a:lnSpc>
+            </a:pPr>
+            <a:r>
+              <a:rPr lang="en-US">
+                <a:solidFill>
+                  <a:srgbClr val="FFFFFF"/>
+                </a:solidFill>
+              </a:rPr>
+              <a:t>Overview</a:t>
+            </a:r>
+          </a:p>
+        </p:txBody>
+      </p:sp>
+      <p:sp useBgFill="1">
+        <p:nvSpPr>
+          <p:cNvPr id="18" name="Rectangle 17">
             <a:extLst>
               <a:ext uri="{FF2B5EF4-FFF2-40B4-BE49-F238E27FC236}">
-                <a16:creationId xmlns:a16="http://schemas.microsoft.com/office/drawing/2014/main" id="{87979404-3DA5-CDFE-515B-6E217CBA8E41}"/>
+                <a16:creationId xmlns:a16="http://schemas.microsoft.com/office/drawing/2014/main" id="{072366D3-9B5C-42E1-9906-77FF6BB55EAB}"/>
+              </a:ext>
+              <a:ext uri="{C183D7F6-B498-43B3-948B-1728B52AA6E4}">
+                <adec:decorative xmlns:adec="http://schemas.microsoft.com/office/drawing/2017/decorative" val="1"/>
               </a:ext>
             </a:extLst>
           </p:cNvPr>
           <p:cNvSpPr>
-            <a:spLocks noGrp="1"/>
-          </p:cNvSpPr>
+            <a:spLocks noGrp="1" noRot="1" noChangeAspect="1" noMove="1" noResize="1" noEditPoints="1" noAdjustHandles="1" noChangeArrowheads="1" noChangeShapeType="1" noTextEdit="1"/>
+          </p:cNvSpPr>
+          <p:nvPr>
+            <p:extLst>
+              <p:ext uri="{386F3935-93C4-4BCD-93E2-E3B085C9AB24}">
+                <p16:designElem xmlns:p16="http://schemas.microsoft.com/office/powerpoint/2015/main" val="1"/>
+              </p:ext>
+            </p:extLst>
+          </p:nvPr>
+        </p:nvSpPr>
+        <p:spPr>
+          <a:xfrm>
+            <a:off x="452283" y="0"/>
+            <a:ext cx="7561007" cy="6858000"/>
+          </a:xfrm>
+          <a:prstGeom prst="rect">
+            <a:avLst/>
+          </a:prstGeom>
+          <a:ln>
+            <a:noFill/>
+          </a:ln>
+        </p:spPr>
+        <p:style>
+          <a:lnRef idx="2">
+            <a:schemeClr val="accent1">
+              <a:shade val="50000"/>
+            </a:schemeClr>
+          </a:lnRef>
+          <a:fillRef idx="1">
+            <a:schemeClr val="accent1"/>
+          </a:fillRef>
+          <a:effectRef idx="0">
+            <a:schemeClr val="accent1"/>
+          </a:effectRef>
+          <a:fontRef idx="minor">
+            <a:schemeClr val="lt1"/>
+          </a:fontRef>
+        </p:style>
+        <p:txBody>
+          <a:bodyPr rtlCol="0" anchor="ctr"/>
+          <a:lstStyle/>
+          <a:p>
+            <a:pPr algn="ctr"/>
+            <a:endParaRPr lang="en-US"/>
+          </a:p>
+        </p:txBody>
+      </p:sp>
+      <p:pic>
+        <p:nvPicPr>
+          <p:cNvPr id="7" name="Content Placeholder 6">
+            <a:extLst>
+              <a:ext uri="{FF2B5EF4-FFF2-40B4-BE49-F238E27FC236}">
+                <a16:creationId xmlns:a16="http://schemas.microsoft.com/office/drawing/2014/main" id="{9F532AC9-F978-0B34-1339-6796671AB232}"/>
+              </a:ext>
+            </a:extLst>
+          </p:cNvPr>
+          <p:cNvPicPr>
+            <a:picLocks noGrp="1" noChangeAspect="1"/>
+          </p:cNvPicPr>
           <p:nvPr>
             <p:ph idx="1"/>
           </p:nvPr>
-        </p:nvSpPr>
-        <p:spPr/>
-        <p:txBody>
-          <a:bodyPr/>
-          <a:lstStyle/>
-          <a:p>
-            <a:r>
-              <a:rPr lang="en-US" dirty="0" err="1"/>
-              <a:t>Ontvangt</a:t>
-            </a:r>
-            <a:r>
-              <a:rPr lang="en-US" dirty="0"/>
-              <a:t> data via medium</a:t>
-            </a:r>
-          </a:p>
-          <a:p>
-            <a:r>
-              <a:rPr lang="en-US" dirty="0"/>
-              <a:t>Output strings (human readable), via </a:t>
-            </a:r>
-            <a:r>
-              <a:rPr lang="en-US" dirty="0" err="1"/>
-              <a:t>een</a:t>
-            </a:r>
-            <a:r>
-              <a:rPr lang="en-US" dirty="0"/>
-              <a:t> Queue, </a:t>
-            </a:r>
-            <a:r>
-              <a:rPr lang="en-US" dirty="0" err="1"/>
-              <a:t>naar</a:t>
-            </a:r>
-            <a:r>
-              <a:rPr lang="en-US" dirty="0"/>
-              <a:t> BL</a:t>
-            </a:r>
-          </a:p>
-          <a:p>
-            <a:endParaRPr lang="en-US" dirty="0"/>
-          </a:p>
-          <a:p>
-            <a:r>
-              <a:rPr lang="en-US" dirty="0"/>
-              <a:t>Prefix: AL_</a:t>
-            </a:r>
-            <a:endParaRPr lang="nl-NL" dirty="0"/>
+        </p:nvPicPr>
+        <p:blipFill>
+          <a:blip r:embed="rId2"/>
+          <a:stretch>
+            <a:fillRect/>
+          </a:stretch>
+        </p:blipFill>
+        <p:spPr>
+          <a:xfrm>
+            <a:off x="514827" y="95982"/>
+            <a:ext cx="7440835" cy="6659547"/>
+          </a:xfrm>
+          <a:prstGeom prst="rect">
+            <a:avLst/>
+          </a:prstGeom>
+        </p:spPr>
+      </p:pic>
+      <p:sp>
+        <p:nvSpPr>
+          <p:cNvPr id="20" name="Rectangle 19">
+            <a:extLst>
+              <a:ext uri="{FF2B5EF4-FFF2-40B4-BE49-F238E27FC236}">
+                <a16:creationId xmlns:a16="http://schemas.microsoft.com/office/drawing/2014/main" id="{121F5E60-4E89-4B16-A245-12BD9935998D}"/>
+              </a:ext>
+              <a:ext uri="{C183D7F6-B498-43B3-948B-1728B52AA6E4}">
+                <adec:decorative xmlns:adec="http://schemas.microsoft.com/office/drawing/2017/decorative" val="1"/>
+              </a:ext>
+            </a:extLst>
+          </p:cNvPr>
+          <p:cNvSpPr>
+            <a:spLocks noGrp="1" noRot="1" noChangeAspect="1" noMove="1" noResize="1" noEditPoints="1" noAdjustHandles="1" noChangeArrowheads="1" noChangeShapeType="1" noTextEdit="1"/>
+          </p:cNvSpPr>
+          <p:nvPr>
+            <p:extLst>
+              <p:ext uri="{386F3935-93C4-4BCD-93E2-E3B085C9AB24}">
+                <p16:designElem xmlns:p16="http://schemas.microsoft.com/office/powerpoint/2015/main" val="1"/>
+              </p:ext>
+            </p:extLst>
+          </p:nvPr>
+        </p:nvSpPr>
+        <p:spPr>
+          <a:xfrm>
+            <a:off x="11292840" y="0"/>
+            <a:ext cx="899160" cy="6858000"/>
+          </a:xfrm>
+          <a:prstGeom prst="rect">
+            <a:avLst/>
+          </a:prstGeom>
+          <a:solidFill>
+            <a:srgbClr val="353537"/>
+          </a:solidFill>
+          <a:ln>
+            <a:noFill/>
+          </a:ln>
+        </p:spPr>
+        <p:style>
+          <a:lnRef idx="2">
+            <a:schemeClr val="accent1">
+              <a:shade val="50000"/>
+            </a:schemeClr>
+          </a:lnRef>
+          <a:fillRef idx="1">
+            <a:schemeClr val="accent1"/>
+          </a:fillRef>
+          <a:effectRef idx="0">
+            <a:schemeClr val="accent1"/>
+          </a:effectRef>
+          <a:fontRef idx="minor">
+            <a:schemeClr val="lt1"/>
+          </a:fontRef>
+        </p:style>
+        <p:txBody>
+          <a:bodyPr rtlCol="0" anchor="ctr"/>
+          <a:lstStyle/>
+          <a:p>
+            <a:pPr algn="ctr"/>
+            <a:endParaRPr lang="en-US"/>
           </a:p>
         </p:txBody>
       </p:sp>
     </p:spTree>
     <p:extLst>
       <p:ext uri="{BB962C8B-B14F-4D97-AF65-F5344CB8AC3E}">
-        <p14:creationId xmlns:p14="http://schemas.microsoft.com/office/powerpoint/2010/main" val="266200895"/>
+        <p14:creationId xmlns:p14="http://schemas.microsoft.com/office/powerpoint/2010/main" val="2394919361"/>
       </p:ext>
     </p:extLst>
   </p:cSld>
@@ -4675,7 +5647,7 @@
           <p:cNvPr id="2" name="Title 1">
             <a:extLst>
               <a:ext uri="{FF2B5EF4-FFF2-40B4-BE49-F238E27FC236}">
-                <a16:creationId xmlns:a16="http://schemas.microsoft.com/office/drawing/2014/main" id="{6BD37CB4-CA78-839A-2A21-55A0FA56CB8B}"/>
+                <a16:creationId xmlns:a16="http://schemas.microsoft.com/office/drawing/2014/main" id="{4C70F8A6-7DF1-7B07-26C4-C6AF0609171D}"/>
               </a:ext>
             </a:extLst>
           </p:cNvPr>
@@ -4693,7 +5665,7 @@
           <a:p>
             <a:r>
               <a:rPr lang="en-US" dirty="0"/>
-              <a:t>Business Layer</a:t>
+              <a:t>Application Layer</a:t>
             </a:r>
             <a:endParaRPr lang="nl-NL" dirty="0"/>
           </a:p>
@@ -4704,7 +5676,7 @@
           <p:cNvPr id="3" name="Content Placeholder 2">
             <a:extLst>
               <a:ext uri="{FF2B5EF4-FFF2-40B4-BE49-F238E27FC236}">
-                <a16:creationId xmlns:a16="http://schemas.microsoft.com/office/drawing/2014/main" id="{27933C9E-A800-1E46-7B5A-1C6C5AFCC6EB}"/>
+                <a16:creationId xmlns:a16="http://schemas.microsoft.com/office/drawing/2014/main" id="{87979404-3DA5-CDFE-515B-6E217CBA8E41}"/>
               </a:ext>
             </a:extLst>
           </p:cNvPr>
@@ -4726,17 +5698,21 @@
             </a:r>
             <a:r>
               <a:rPr lang="en-US" dirty="0"/>
-              <a:t> strings</a:t>
-            </a:r>
-          </a:p>
-          <a:p>
+              <a:t> data via medium</a:t>
+            </a:r>
+          </a:p>
+          <a:p>
+            <a:r>
+              <a:rPr lang="en-US" dirty="0"/>
+              <a:t>Output strings (human readable), via </a:t>
+            </a:r>
             <a:r>
               <a:rPr lang="en-US" dirty="0" err="1"/>
-              <a:t>Converteert</a:t>
-            </a:r>
-            <a:r>
-              <a:rPr lang="en-US" dirty="0"/>
-              <a:t> strings </a:t>
+              <a:t>een</a:t>
+            </a:r>
+            <a:r>
+              <a:rPr lang="en-US" dirty="0"/>
+              <a:t> Queue, </a:t>
             </a:r>
             <a:r>
               <a:rPr lang="en-US" dirty="0" err="1"/>
@@ -4744,21 +5720,7 @@
             </a:r>
             <a:r>
               <a:rPr lang="en-US" dirty="0"/>
-              <a:t> machine readable data (tokenizer, </a:t>
-            </a:r>
-            <a:r>
-              <a:rPr lang="en-US" dirty="0" err="1"/>
-              <a:t>lexer</a:t>
-            </a:r>
-            <a:r>
-              <a:rPr lang="en-US" dirty="0"/>
-              <a:t>)</a:t>
-            </a:r>
-          </a:p>
-          <a:p>
-            <a:r>
-              <a:rPr lang="en-US" dirty="0"/>
-              <a:t>Output -&gt; micro-operations </a:t>
+              <a:t> BL</a:t>
             </a:r>
           </a:p>
           <a:p>
@@ -4767,7 +5729,7 @@
           <a:p>
             <a:r>
               <a:rPr lang="en-US" dirty="0"/>
-              <a:t>Prefix: BL_ </a:t>
+              <a:t>Prefix: AL_</a:t>
             </a:r>
             <a:endParaRPr lang="nl-NL" dirty="0"/>
           </a:p>
@@ -4776,7 +5738,7 @@
     </p:spTree>
     <p:extLst>
       <p:ext uri="{BB962C8B-B14F-4D97-AF65-F5344CB8AC3E}">
-        <p14:creationId xmlns:p14="http://schemas.microsoft.com/office/powerpoint/2010/main" val="2343313133"/>
+        <p14:creationId xmlns:p14="http://schemas.microsoft.com/office/powerpoint/2010/main" val="266200895"/>
       </p:ext>
     </p:extLst>
   </p:cSld>
@@ -4808,7 +5770,7 @@
           <p:cNvPr id="2" name="Title 1">
             <a:extLst>
               <a:ext uri="{FF2B5EF4-FFF2-40B4-BE49-F238E27FC236}">
-                <a16:creationId xmlns:a16="http://schemas.microsoft.com/office/drawing/2014/main" id="{C012717C-13D4-FA65-9302-87905FAF1E86}"/>
+                <a16:creationId xmlns:a16="http://schemas.microsoft.com/office/drawing/2014/main" id="{6BD37CB4-CA78-839A-2A21-55A0FA56CB8B}"/>
               </a:ext>
             </a:extLst>
           </p:cNvPr>
@@ -4826,7 +5788,7 @@
           <a:p>
             <a:r>
               <a:rPr lang="en-US" dirty="0"/>
-              <a:t>API Layer</a:t>
+              <a:t>Business Layer</a:t>
             </a:r>
             <a:endParaRPr lang="nl-NL" dirty="0"/>
           </a:p>
@@ -4837,7 +5799,7 @@
           <p:cNvPr id="3" name="Content Placeholder 2">
             <a:extLst>
               <a:ext uri="{FF2B5EF4-FFF2-40B4-BE49-F238E27FC236}">
-                <a16:creationId xmlns:a16="http://schemas.microsoft.com/office/drawing/2014/main" id="{142D41B6-C0B5-C2EF-18E7-35148C741B1A}"/>
+                <a16:creationId xmlns:a16="http://schemas.microsoft.com/office/drawing/2014/main" id="{27933C9E-A800-1E46-7B5A-1C6C5AFCC6EB}"/>
               </a:ext>
             </a:extLst>
           </p:cNvPr>
@@ -4855,36 +5817,53 @@
           <a:p>
             <a:r>
               <a:rPr lang="en-US" dirty="0" err="1"/>
-              <a:t>Voert</a:t>
-            </a:r>
-            <a:r>
-              <a:rPr lang="en-US" dirty="0"/>
-              <a:t> </a:t>
-            </a:r>
+              <a:t>Ontvangt</a:t>
+            </a:r>
+            <a:r>
+              <a:rPr lang="en-US" dirty="0"/>
+              <a:t> strings</a:t>
+            </a:r>
+          </a:p>
+          <a:p>
             <a:r>
               <a:rPr lang="en-US" dirty="0" err="1"/>
-              <a:t>uOps</a:t>
-            </a:r>
-            <a:r>
-              <a:rPr lang="en-US" dirty="0"/>
-              <a:t> van de BL </a:t>
+              <a:t>Converteert</a:t>
+            </a:r>
+            <a:r>
+              <a:rPr lang="en-US" dirty="0"/>
+              <a:t> strings </a:t>
             </a:r>
             <a:r>
               <a:rPr lang="en-US" dirty="0" err="1"/>
-              <a:t>uit</a:t>
-            </a:r>
+              <a:t>naar</a:t>
+            </a:r>
+            <a:r>
+              <a:rPr lang="en-US" dirty="0"/>
+              <a:t> machine readable data (tokenizer, </a:t>
+            </a:r>
+            <a:r>
+              <a:rPr lang="en-US" dirty="0" err="1"/>
+              <a:t>lexer</a:t>
+            </a:r>
+            <a:r>
+              <a:rPr lang="en-US" dirty="0"/>
+              <a:t>)</a:t>
+            </a:r>
+          </a:p>
+          <a:p>
+            <a:r>
+              <a:rPr lang="en-US" dirty="0"/>
+              <a:t>Output -&gt; micro-operations </a:t>
+            </a:r>
+          </a:p>
+          <a:p>
             <a:endParaRPr lang="en-US" dirty="0"/>
           </a:p>
           <a:p>
-            <a:endParaRPr lang="en-US" dirty="0"/>
-          </a:p>
-          <a:p>
-            <a:r>
-              <a:rPr lang="en-US" dirty="0"/>
-              <a:t>Prefix: API_</a:t>
-            </a:r>
-          </a:p>
-          <a:p>
+            <a:r>
+              <a:rPr lang="en-US" dirty="0"/>
+              <a:t>Prefix: BL_ </a:t>
+            </a:r>
             <a:endParaRPr lang="nl-NL" dirty="0"/>
           </a:p>
         </p:txBody>
@@ -4892,7 +5871,7 @@
     </p:spTree>
     <p:extLst>
       <p:ext uri="{BB962C8B-B14F-4D97-AF65-F5344CB8AC3E}">
-        <p14:creationId xmlns:p14="http://schemas.microsoft.com/office/powerpoint/2010/main" val="4258888933"/>
+        <p14:creationId xmlns:p14="http://schemas.microsoft.com/office/powerpoint/2010/main" val="2343313133"/>
       </p:ext>
     </p:extLst>
   </p:cSld>
@@ -4924,7 +5903,7 @@
           <p:cNvPr id="2" name="Title 1">
             <a:extLst>
               <a:ext uri="{FF2B5EF4-FFF2-40B4-BE49-F238E27FC236}">
-                <a16:creationId xmlns:a16="http://schemas.microsoft.com/office/drawing/2014/main" id="{3EAE4282-86E8-EB68-2CAD-80BA67FBEFB9}"/>
+                <a16:creationId xmlns:a16="http://schemas.microsoft.com/office/drawing/2014/main" id="{C012717C-13D4-FA65-9302-87905FAF1E86}"/>
               </a:ext>
             </a:extLst>
           </p:cNvPr>
@@ -4942,11 +5921,7 @@
           <a:p>
             <a:r>
               <a:rPr lang="en-US" dirty="0"/>
-              <a:t>Continuous Development (CD) </a:t>
-            </a:r>
-            <a:r>
-              <a:rPr lang="en-US" dirty="0" err="1"/>
-              <a:t>omgeving</a:t>
+              <a:t>API Layer</a:t>
             </a:r>
             <a:endParaRPr lang="nl-NL" dirty="0"/>
           </a:p>
@@ -4954,10 +5929,10 @@
       </p:sp>
       <p:sp>
         <p:nvSpPr>
-          <p:cNvPr id="3" name="Text Placeholder 2">
+          <p:cNvPr id="3" name="Content Placeholder 2">
             <a:extLst>
               <a:ext uri="{FF2B5EF4-FFF2-40B4-BE49-F238E27FC236}">
-                <a16:creationId xmlns:a16="http://schemas.microsoft.com/office/drawing/2014/main" id="{F89D5E26-D625-2114-E1F5-C567B91F8C85}"/>
+                <a16:creationId xmlns:a16="http://schemas.microsoft.com/office/drawing/2014/main" id="{142D41B6-C0B5-C2EF-18E7-35148C741B1A}"/>
               </a:ext>
             </a:extLst>
           </p:cNvPr>
@@ -4965,7 +5940,7 @@
             <a:spLocks noGrp="1"/>
           </p:cNvSpPr>
           <p:nvPr>
-            <p:ph type="body" idx="1"/>
+            <p:ph idx="1"/>
           </p:nvPr>
         </p:nvSpPr>
         <p:spPr/>
@@ -4974,17 +5949,37 @@
           <a:lstStyle/>
           <a:p>
             <a:r>
-              <a:rPr lang="en-US" dirty="0"/>
-              <a:t>Git </a:t>
-            </a:r>
-            <a:r>
               <a:rPr lang="en-US" dirty="0" err="1"/>
-              <a:t>en</a:t>
-            </a:r>
-            <a:r>
-              <a:rPr lang="en-US" dirty="0"/>
-              <a:t> Workflows</a:t>
-            </a:r>
+              <a:t>Voert</a:t>
+            </a:r>
+            <a:r>
+              <a:rPr lang="en-US" dirty="0"/>
+              <a:t> </a:t>
+            </a:r>
+            <a:r>
+              <a:rPr lang="en-US" dirty="0" err="1"/>
+              <a:t>uOps</a:t>
+            </a:r>
+            <a:r>
+              <a:rPr lang="en-US" dirty="0"/>
+              <a:t> van de BL </a:t>
+            </a:r>
+            <a:r>
+              <a:rPr lang="en-US" dirty="0" err="1"/>
+              <a:t>uit</a:t>
+            </a:r>
+            <a:endParaRPr lang="en-US" dirty="0"/>
+          </a:p>
+          <a:p>
+            <a:endParaRPr lang="en-US" dirty="0"/>
+          </a:p>
+          <a:p>
+            <a:r>
+              <a:rPr lang="en-US" dirty="0"/>
+              <a:t>Prefix: API_</a:t>
+            </a:r>
+          </a:p>
+          <a:p>
             <a:endParaRPr lang="nl-NL" dirty="0"/>
           </a:p>
         </p:txBody>
@@ -4992,7 +5987,7 @@
     </p:spTree>
     <p:extLst>
       <p:ext uri="{BB962C8B-B14F-4D97-AF65-F5344CB8AC3E}">
-        <p14:creationId xmlns:p14="http://schemas.microsoft.com/office/powerpoint/2010/main" val="2703176933"/>
+        <p14:creationId xmlns:p14="http://schemas.microsoft.com/office/powerpoint/2010/main" val="4258888933"/>
       </p:ext>
     </p:extLst>
   </p:cSld>
@@ -5005,14 +6000,6 @@
 <file path=ppt/slides/slide8.xml><?xml version="1.0" encoding="utf-8"?>
 <p:sld xmlns:a="http://schemas.openxmlformats.org/drawingml/2006/main" xmlns:r="http://schemas.openxmlformats.org/officeDocument/2006/relationships" xmlns:p="http://schemas.openxmlformats.org/presentationml/2006/main">
   <p:cSld>
-    <p:bg>
-      <p:bgPr>
-        <a:solidFill>
-          <a:schemeClr val="bg1"/>
-        </a:solidFill>
-        <a:effectLst/>
-      </p:bgPr>
-    </p:bg>
     <p:spTree>
       <p:nvGrpSpPr>
         <p:cNvPr id="1" name=""/>
@@ -5027,72 +6014,45 @@
           <a:chExt cx="0" cy="0"/>
         </a:xfrm>
       </p:grpSpPr>
-      <p:sp useBgFill="1">
-        <p:nvSpPr>
-          <p:cNvPr id="10" name="Rectangle 9">
+      <p:sp>
+        <p:nvSpPr>
+          <p:cNvPr id="2" name="Title 1">
             <a:extLst>
               <a:ext uri="{FF2B5EF4-FFF2-40B4-BE49-F238E27FC236}">
-                <a16:creationId xmlns:a16="http://schemas.microsoft.com/office/drawing/2014/main" id="{E53F4E5A-C9EE-4859-B46B-F018F7D73A03}"/>
-              </a:ext>
-              <a:ext uri="{C183D7F6-B498-43B3-948B-1728B52AA6E4}">
-                <adec:decorative xmlns:adec="http://schemas.microsoft.com/office/drawing/2017/decorative" val="1"/>
+                <a16:creationId xmlns:a16="http://schemas.microsoft.com/office/drawing/2014/main" id="{3EAE4282-86E8-EB68-2CAD-80BA67FBEFB9}"/>
               </a:ext>
             </a:extLst>
           </p:cNvPr>
           <p:cNvSpPr>
-            <a:spLocks noGrp="1" noRot="1" noChangeAspect="1" noMove="1" noResize="1" noEditPoints="1" noAdjustHandles="1" noChangeArrowheads="1" noChangeShapeType="1" noTextEdit="1"/>
-          </p:cNvSpPr>
-          <p:nvPr>
-            <p:extLst>
-              <p:ext uri="{386F3935-93C4-4BCD-93E2-E3B085C9AB24}">
-                <p16:designElem xmlns:p16="http://schemas.microsoft.com/office/powerpoint/2015/main" val="1"/>
-              </p:ext>
-            </p:extLst>
-          </p:nvPr>
-        </p:nvSpPr>
-        <p:spPr>
-          <a:xfrm>
-            <a:off x="0" y="0"/>
-            <a:ext cx="11292840" cy="6858000"/>
-          </a:xfrm>
-          <a:prstGeom prst="rect">
-            <a:avLst/>
-          </a:prstGeom>
-          <a:ln>
-            <a:noFill/>
-          </a:ln>
-        </p:spPr>
-        <p:style>
-          <a:lnRef idx="2">
-            <a:schemeClr val="accent1">
-              <a:shade val="50000"/>
-            </a:schemeClr>
-          </a:lnRef>
-          <a:fillRef idx="1">
-            <a:schemeClr val="accent1"/>
-          </a:fillRef>
-          <a:effectRef idx="0">
-            <a:schemeClr val="accent1"/>
-          </a:effectRef>
-          <a:fontRef idx="minor">
-            <a:schemeClr val="lt1"/>
-          </a:fontRef>
-        </p:style>
-        <p:txBody>
-          <a:bodyPr rtlCol="0" anchor="ctr"/>
-          <a:lstStyle/>
-          <a:p>
-            <a:pPr algn="ctr"/>
-            <a:endParaRPr lang="en-US"/>
-          </a:p>
-        </p:txBody>
-      </p:sp>
-      <p:sp>
-        <p:nvSpPr>
-          <p:cNvPr id="2" name="Title 1">
+            <a:spLocks noGrp="1"/>
+          </p:cNvSpPr>
+          <p:nvPr>
+            <p:ph type="title"/>
+          </p:nvPr>
+        </p:nvSpPr>
+        <p:spPr/>
+        <p:txBody>
+          <a:bodyPr/>
+          <a:lstStyle/>
+          <a:p>
+            <a:r>
+              <a:rPr lang="en-US" dirty="0"/>
+              <a:t>Continuous Development (CD) </a:t>
+            </a:r>
+            <a:r>
+              <a:rPr lang="en-US" dirty="0" err="1"/>
+              <a:t>omgeving</a:t>
+            </a:r>
+            <a:endParaRPr lang="nl-NL" dirty="0"/>
+          </a:p>
+        </p:txBody>
+      </p:sp>
+      <p:sp>
+        <p:nvSpPr>
+          <p:cNvPr id="3" name="Text Placeholder 2">
             <a:extLst>
               <a:ext uri="{FF2B5EF4-FFF2-40B4-BE49-F238E27FC236}">
-                <a16:creationId xmlns:a16="http://schemas.microsoft.com/office/drawing/2014/main" id="{F7EB11C1-4F82-C425-D2E4-E4CA42860F4E}"/>
+                <a16:creationId xmlns:a16="http://schemas.microsoft.com/office/drawing/2014/main" id="{F89D5E26-D625-2114-E1F5-C567B91F8C85}"/>
               </a:ext>
             </a:extLst>
           </p:cNvPr>
@@ -5100,156 +6060,34 @@
             <a:spLocks noGrp="1"/>
           </p:cNvSpPr>
           <p:nvPr>
-            <p:ph type="title"/>
-          </p:nvPr>
-        </p:nvSpPr>
-        <p:spPr>
-          <a:xfrm>
-            <a:off x="643468" y="4564674"/>
-            <a:ext cx="4010820" cy="1615461"/>
-          </a:xfrm>
-        </p:spPr>
-        <p:txBody>
-          <a:bodyPr anchor="ctr">
-            <a:normAutofit/>
-          </a:bodyPr>
-          <a:lstStyle/>
-          <a:p>
-            <a:r>
-              <a:rPr lang="en-US" sz="3200"/>
-              <a:t>Scrum</a:t>
-            </a:r>
-            <a:endParaRPr lang="nl-NL" sz="3200"/>
-          </a:p>
-        </p:txBody>
-      </p:sp>
-      <p:pic>
-        <p:nvPicPr>
-          <p:cNvPr id="5" name="Picture 4">
-            <a:extLst>
-              <a:ext uri="{FF2B5EF4-FFF2-40B4-BE49-F238E27FC236}">
-                <a16:creationId xmlns:a16="http://schemas.microsoft.com/office/drawing/2014/main" id="{308FD53A-E8D7-5942-65B7-91D4C91B2DC8}"/>
-              </a:ext>
-            </a:extLst>
-          </p:cNvPr>
-          <p:cNvPicPr>
-            <a:picLocks noChangeAspect="1"/>
-          </p:cNvPicPr>
-          <p:nvPr/>
-        </p:nvPicPr>
-        <p:blipFill rotWithShape="1">
-          <a:blip r:embed="rId2"/>
-          <a:srcRect l="3353" r="27620"/>
-          <a:stretch/>
-        </p:blipFill>
-        <p:spPr>
-          <a:xfrm>
-            <a:off x="20" y="1"/>
-            <a:ext cx="11292820" cy="4212708"/>
-          </a:xfrm>
-          <a:prstGeom prst="rect">
-            <a:avLst/>
-          </a:prstGeom>
-        </p:spPr>
-      </p:pic>
-      <p:cxnSp>
-        <p:nvCxnSpPr>
-          <p:cNvPr id="12" name="Straight Connector 11">
-            <a:extLst>
-              <a:ext uri="{FF2B5EF4-FFF2-40B4-BE49-F238E27FC236}">
-                <a16:creationId xmlns:a16="http://schemas.microsoft.com/office/drawing/2014/main" id="{041A955B-D579-48FD-A51C-51B0C0B69F9A}"/>
-              </a:ext>
-              <a:ext uri="{C183D7F6-B498-43B3-948B-1728B52AA6E4}">
-                <adec:decorative xmlns:adec="http://schemas.microsoft.com/office/drawing/2017/decorative" val="1"/>
-              </a:ext>
-            </a:extLst>
-          </p:cNvPr>
-          <p:cNvCxnSpPr>
-            <a:cxnSpLocks noGrp="1" noRot="1" noChangeAspect="1" noMove="1" noResize="1" noEditPoints="1" noAdjustHandles="1" noChangeArrowheads="1" noChangeShapeType="1"/>
-          </p:cNvCxnSpPr>
-          <p:nvPr>
-            <p:extLst>
-              <p:ext uri="{386F3935-93C4-4BCD-93E2-E3B085C9AB24}">
-                <p16:designElem xmlns:p16="http://schemas.microsoft.com/office/powerpoint/2015/main" val="1"/>
-              </p:ext>
-            </p:extLst>
-          </p:nvPr>
-        </p:nvCxnSpPr>
-        <p:spPr>
-          <a:xfrm>
-            <a:off x="4953000" y="4813604"/>
-            <a:ext cx="0" cy="1117600"/>
-          </a:xfrm>
-          <a:prstGeom prst="line">
-            <a:avLst/>
-          </a:prstGeom>
-          <a:ln>
-            <a:solidFill>
-              <a:schemeClr val="accent1"/>
-            </a:solidFill>
-          </a:ln>
-        </p:spPr>
-        <p:style>
-          <a:lnRef idx="1">
-            <a:schemeClr val="accent1"/>
-          </a:lnRef>
-          <a:fillRef idx="0">
-            <a:schemeClr val="accent1"/>
-          </a:fillRef>
-          <a:effectRef idx="0">
-            <a:schemeClr val="accent1"/>
-          </a:effectRef>
-          <a:fontRef idx="minor">
-            <a:schemeClr val="tx1"/>
-          </a:fontRef>
-        </p:style>
-      </p:cxnSp>
-      <p:sp>
-        <p:nvSpPr>
-          <p:cNvPr id="3" name="Content Placeholder 2">
-            <a:extLst>
-              <a:ext uri="{FF2B5EF4-FFF2-40B4-BE49-F238E27FC236}">
-                <a16:creationId xmlns:a16="http://schemas.microsoft.com/office/drawing/2014/main" id="{0BDB1A19-0CAF-3E91-C730-468C978654AC}"/>
-              </a:ext>
-            </a:extLst>
-          </p:cNvPr>
-          <p:cNvSpPr>
-            <a:spLocks noGrp="1"/>
-          </p:cNvSpPr>
-          <p:nvPr>
-            <p:ph idx="1"/>
-          </p:nvPr>
-        </p:nvSpPr>
-        <p:spPr>
-          <a:xfrm>
-            <a:off x="5288640" y="4564673"/>
-            <a:ext cx="5665871" cy="1615463"/>
-          </a:xfrm>
-        </p:spPr>
-        <p:txBody>
-          <a:bodyPr anchor="ctr">
-            <a:normAutofit/>
-          </a:bodyPr>
-          <a:lstStyle/>
-          <a:p>
-            <a:r>
-              <a:rPr lang="en-US" sz="1600"/>
-              <a:t>Scrum-like omgeving</a:t>
-            </a:r>
-          </a:p>
-          <a:p>
-            <a:r>
-              <a:rPr lang="en-US" sz="1600"/>
-              <a:t>Taken, userstories en issue tracking</a:t>
-            </a:r>
-            <a:endParaRPr lang="nl-NL" sz="1600"/>
+            <p:ph type="body" idx="1"/>
+          </p:nvPr>
+        </p:nvSpPr>
+        <p:spPr/>
+        <p:txBody>
+          <a:bodyPr/>
+          <a:lstStyle/>
+          <a:p>
+            <a:r>
+              <a:rPr lang="en-US" dirty="0"/>
+              <a:t>Git </a:t>
+            </a:r>
+            <a:r>
+              <a:rPr lang="en-US" dirty="0" err="1"/>
+              <a:t>en</a:t>
+            </a:r>
+            <a:r>
+              <a:rPr lang="en-US" dirty="0"/>
+              <a:t> Workflows</a:t>
+            </a:r>
+            <a:endParaRPr lang="nl-NL" dirty="0"/>
           </a:p>
         </p:txBody>
       </p:sp>
     </p:spTree>
     <p:extLst>
       <p:ext uri="{BB962C8B-B14F-4D97-AF65-F5344CB8AC3E}">
-        <p14:creationId xmlns:p14="http://schemas.microsoft.com/office/powerpoint/2010/main" val="3293275134"/>
+        <p14:creationId xmlns:p14="http://schemas.microsoft.com/office/powerpoint/2010/main" val="2703176933"/>
       </p:ext>
     </p:extLst>
   </p:cSld>
@@ -5284,6 +6122,66 @@
           <a:chExt cx="0" cy="0"/>
         </a:xfrm>
       </p:grpSpPr>
+      <p:sp useBgFill="1">
+        <p:nvSpPr>
+          <p:cNvPr id="17" name="Rectangle 16">
+            <a:extLst>
+              <a:ext uri="{FF2B5EF4-FFF2-40B4-BE49-F238E27FC236}">
+                <a16:creationId xmlns:a16="http://schemas.microsoft.com/office/drawing/2014/main" id="{73167118-CCC6-4EA0-956F-63D5BBB02EFE}"/>
+              </a:ext>
+              <a:ext uri="{C183D7F6-B498-43B3-948B-1728B52AA6E4}">
+                <adec:decorative xmlns:adec="http://schemas.microsoft.com/office/drawing/2017/decorative" val="1"/>
+              </a:ext>
+            </a:extLst>
+          </p:cNvPr>
+          <p:cNvSpPr>
+            <a:spLocks noGrp="1" noRot="1" noChangeAspect="1" noMove="1" noResize="1" noEditPoints="1" noAdjustHandles="1" noChangeArrowheads="1" noChangeShapeType="1" noTextEdit="1"/>
+          </p:cNvSpPr>
+          <p:nvPr>
+            <p:extLst>
+              <p:ext uri="{386F3935-93C4-4BCD-93E2-E3B085C9AB24}">
+                <p16:designElem xmlns:p16="http://schemas.microsoft.com/office/powerpoint/2015/main" val="1"/>
+              </p:ext>
+            </p:extLst>
+          </p:nvPr>
+        </p:nvSpPr>
+        <p:spPr>
+          <a:xfrm>
+            <a:off x="0" y="0"/>
+            <a:ext cx="11292840" cy="6858000"/>
+          </a:xfrm>
+          <a:prstGeom prst="rect">
+            <a:avLst/>
+          </a:prstGeom>
+          <a:ln>
+            <a:noFill/>
+          </a:ln>
+        </p:spPr>
+        <p:style>
+          <a:lnRef idx="2">
+            <a:schemeClr val="accent1">
+              <a:shade val="50000"/>
+            </a:schemeClr>
+          </a:lnRef>
+          <a:fillRef idx="1">
+            <a:schemeClr val="accent1"/>
+          </a:fillRef>
+          <a:effectRef idx="0">
+            <a:schemeClr val="accent1"/>
+          </a:effectRef>
+          <a:fontRef idx="minor">
+            <a:schemeClr val="lt1"/>
+          </a:fontRef>
+        </p:style>
+        <p:txBody>
+          <a:bodyPr rtlCol="0" anchor="ctr"/>
+          <a:lstStyle/>
+          <a:p>
+            <a:pPr algn="ctr"/>
+            <a:endParaRPr lang="en-US"/>
+          </a:p>
+        </p:txBody>
+      </p:sp>
       <p:sp>
         <p:nvSpPr>
           <p:cNvPr id="2" name="Title 1">
@@ -5302,8 +6200,8 @@
         </p:nvSpPr>
         <p:spPr>
           <a:xfrm>
-            <a:off x="4965290" y="365760"/>
-            <a:ext cx="5997678" cy="1325562"/>
+            <a:off x="6315076" y="365760"/>
+            <a:ext cx="4639436" cy="1325562"/>
           </a:xfrm>
         </p:spPr>
         <p:txBody>
@@ -5313,7 +6211,7 @@
           <a:lstStyle/>
           <a:p>
             <a:r>
-              <a:rPr lang="en-US" dirty="0" err="1"/>
+              <a:rPr lang="en-US"/>
               <a:t>Taak</a:t>
             </a:r>
             <a:endParaRPr lang="nl-NL" dirty="0"/>
@@ -5322,10 +6220,10 @@
       </p:sp>
       <p:pic>
         <p:nvPicPr>
-          <p:cNvPr id="5" name="Picture 4">
+          <p:cNvPr id="10" name="Picture 9">
             <a:extLst>
               <a:ext uri="{FF2B5EF4-FFF2-40B4-BE49-F238E27FC236}">
-                <a16:creationId xmlns:a16="http://schemas.microsoft.com/office/drawing/2014/main" id="{8087A57B-BDBF-DFE8-D663-36933D91CCEE}"/>
+                <a16:creationId xmlns:a16="http://schemas.microsoft.com/office/drawing/2014/main" id="{D2B63A38-66DA-281D-4907-A8BFD521F55A}"/>
               </a:ext>
             </a:extLst>
           </p:cNvPr>
@@ -5336,17 +6234,44 @@
         </p:nvPicPr>
         <p:blipFill rotWithShape="1">
           <a:blip r:embed="rId2"/>
-          <a:srcRect r="23975"/>
+          <a:srcRect l="2232" t="-533" r="17639" b="535"/>
           <a:stretch/>
         </p:blipFill>
         <p:spPr>
           <a:xfrm>
-            <a:off x="20" y="10"/>
-            <a:ext cx="4653291" cy="6857990"/>
+            <a:off x="161151" y="160866"/>
+            <a:ext cx="5784972" cy="3772147"/>
           </a:xfrm>
-          <a:prstGeom prst="rect">
+          <a:custGeom>
             <a:avLst/>
-          </a:prstGeom>
+            <a:gdLst/>
+            <a:ahLst/>
+            <a:cxnLst/>
+            <a:rect l="l" t="t" r="r" b="b"/>
+            <a:pathLst>
+              <a:path w="3762123" h="3772147">
+                <a:moveTo>
+                  <a:pt x="0" y="0"/>
+                </a:moveTo>
+                <a:lnTo>
+                  <a:pt x="3762123" y="0"/>
+                </a:lnTo>
+                <a:lnTo>
+                  <a:pt x="3762123" y="2803198"/>
+                </a:lnTo>
+                <a:lnTo>
+                  <a:pt x="1898122" y="2803198"/>
+                </a:lnTo>
+                <a:lnTo>
+                  <a:pt x="1898122" y="3772147"/>
+                </a:lnTo>
+                <a:lnTo>
+                  <a:pt x="0" y="3772147"/>
+                </a:lnTo>
+                <a:close/>
+              </a:path>
+            </a:pathLst>
+          </a:custGeom>
         </p:spPr>
       </p:pic>
       <p:sp>
@@ -5367,8 +6292,8 @@
         </p:nvSpPr>
         <p:spPr>
           <a:xfrm>
-            <a:off x="4965290" y="2005739"/>
-            <a:ext cx="6015571" cy="4174398"/>
+            <a:off x="6315076" y="1828800"/>
+            <a:ext cx="4677389" cy="4476750"/>
           </a:xfrm>
         </p:spPr>
         <p:txBody>
@@ -5378,79 +6303,116 @@
           <a:lstStyle/>
           <a:p>
             <a:r>
-              <a:rPr lang="en-US" dirty="0" err="1"/>
+              <a:rPr lang="en-US"/>
               <a:t>Beschrijving</a:t>
             </a:r>
-            <a:endParaRPr lang="en-US" dirty="0"/>
-          </a:p>
-          <a:p>
-            <a:r>
-              <a:rPr lang="en-US" dirty="0" err="1"/>
+          </a:p>
+          <a:p>
+            <a:r>
+              <a:rPr lang="en-US"/>
               <a:t>Eigenaar</a:t>
             </a:r>
-            <a:endParaRPr lang="en-US" dirty="0"/>
-          </a:p>
-          <a:p>
-            <a:r>
-              <a:rPr lang="en-US" dirty="0"/>
+          </a:p>
+          <a:p>
+            <a:r>
+              <a:rPr lang="en-US"/>
               <a:t>Labels</a:t>
             </a:r>
           </a:p>
           <a:p>
             <a:r>
-              <a:rPr lang="en-US" dirty="0"/>
+              <a:rPr lang="en-US"/>
               <a:t>Branch</a:t>
             </a:r>
           </a:p>
           <a:p>
             <a:pPr lvl="1"/>
             <a:r>
-              <a:rPr lang="en-US" dirty="0"/>
-              <a:t>[Nummer] [</a:t>
-            </a:r>
-            <a:r>
-              <a:rPr lang="en-US" dirty="0" err="1"/>
-              <a:t>Titel</a:t>
-            </a:r>
-            <a:r>
-              <a:rPr lang="en-US" dirty="0"/>
-              <a:t>] </a:t>
+              <a:rPr lang="en-US"/>
+              <a:t>[Nummer] [Titel] </a:t>
             </a:r>
           </a:p>
           <a:p>
             <a:pPr lvl="1"/>
             <a:r>
-              <a:rPr lang="en-US" dirty="0"/>
-              <a:t>[Nummer] [Korte </a:t>
-            </a:r>
-            <a:r>
-              <a:rPr lang="en-US" dirty="0" err="1"/>
-              <a:t>beschijving</a:t>
-            </a:r>
-            <a:r>
-              <a:rPr lang="en-US" dirty="0"/>
-              <a:t>]</a:t>
-            </a:r>
-          </a:p>
-          <a:p>
-            <a:r>
-              <a:rPr lang="nl-NL" dirty="0" err="1"/>
-              <a:t>Comments</a:t>
-            </a:r>
-            <a:r>
-              <a:rPr lang="nl-NL" dirty="0"/>
-              <a:t> op voortgang </a:t>
+              <a:rPr lang="en-US"/>
+              <a:t>[Nummer] [Korte beschijving]</a:t>
+            </a:r>
+          </a:p>
+          <a:p>
+            <a:r>
+              <a:rPr lang="nl-NL"/>
+              <a:t>Comments op voortgang </a:t>
             </a:r>
             <a:br>
-              <a:rPr lang="nl-NL" dirty="0"/>
+              <a:rPr lang="nl-NL"/>
             </a:br>
             <a:r>
-              <a:rPr lang="nl-NL" dirty="0"/>
+              <a:rPr lang="nl-NL"/>
               <a:t>	of problemen</a:t>
             </a:r>
-          </a:p>
-        </p:txBody>
-      </p:sp>
+            <a:endParaRPr lang="nl-NL" dirty="0"/>
+          </a:p>
+        </p:txBody>
+      </p:sp>
+      <p:pic>
+        <p:nvPicPr>
+          <p:cNvPr id="8" name="Picture 7">
+            <a:extLst>
+              <a:ext uri="{FF2B5EF4-FFF2-40B4-BE49-F238E27FC236}">
+                <a16:creationId xmlns:a16="http://schemas.microsoft.com/office/drawing/2014/main" id="{CE9613BF-0F83-2773-597B-D5EEF9527BF1}"/>
+              </a:ext>
+            </a:extLst>
+          </p:cNvPr>
+          <p:cNvPicPr>
+            <a:picLocks noChangeAspect="1"/>
+          </p:cNvPicPr>
+          <p:nvPr/>
+        </p:nvPicPr>
+        <p:blipFill rotWithShape="1">
+          <a:blip r:embed="rId3"/>
+          <a:srcRect t="3940" r="-4" b="-4"/>
+          <a:stretch/>
+        </p:blipFill>
+        <p:spPr>
+          <a:xfrm>
+            <a:off x="161153" y="4051885"/>
+            <a:ext cx="2922516" cy="2659982"/>
+          </a:xfrm>
+          <a:prstGeom prst="rect">
+            <a:avLst/>
+          </a:prstGeom>
+        </p:spPr>
+      </p:pic>
+      <p:pic>
+        <p:nvPicPr>
+          <p:cNvPr id="12" name="Picture 11">
+            <a:extLst>
+              <a:ext uri="{FF2B5EF4-FFF2-40B4-BE49-F238E27FC236}">
+                <a16:creationId xmlns:a16="http://schemas.microsoft.com/office/drawing/2014/main" id="{050E0E95-8219-8878-5DAD-8FC4A5F4131C}"/>
+              </a:ext>
+            </a:extLst>
+          </p:cNvPr>
+          <p:cNvPicPr>
+            <a:picLocks noChangeAspect="1"/>
+          </p:cNvPicPr>
+          <p:nvPr/>
+        </p:nvPicPr>
+        <p:blipFill rotWithShape="1">
+          <a:blip r:embed="rId4"/>
+          <a:srcRect l="2" t="1114" b="22172"/>
+          <a:stretch/>
+        </p:blipFill>
+        <p:spPr>
+          <a:xfrm>
+            <a:off x="3202542" y="3082937"/>
+            <a:ext cx="2743583" cy="3628930"/>
+          </a:xfrm>
+          <a:prstGeom prst="rect">
+            <a:avLst/>
+          </a:prstGeom>
+        </p:spPr>
+      </p:pic>
     </p:spTree>
     <p:extLst>
       <p:ext uri="{BB962C8B-B14F-4D97-AF65-F5344CB8AC3E}">

</xml_diff>